<commit_message>
Alice is not happy
</commit_message>
<xml_diff>
--- a/presentation_SC.pptx
+++ b/presentation_SC.pptx
@@ -5,7 +5,7 @@
     <p:sldMasterId id="2147484038" r:id="rId1"/>
   </p:sldMasterIdLst>
   <p:notesMasterIdLst>
-    <p:notesMasterId r:id="rId19"/>
+    <p:notesMasterId r:id="rId24"/>
   </p:notesMasterIdLst>
   <p:sldIdLst>
     <p:sldId id="256" r:id="rId2"/>
@@ -23,8 +23,13 @@
     <p:sldId id="263" r:id="rId14"/>
     <p:sldId id="269" r:id="rId15"/>
     <p:sldId id="270" r:id="rId16"/>
-    <p:sldId id="275" r:id="rId17"/>
-    <p:sldId id="276" r:id="rId18"/>
+    <p:sldId id="277" r:id="rId17"/>
+    <p:sldId id="278" r:id="rId18"/>
+    <p:sldId id="281" r:id="rId19"/>
+    <p:sldId id="279" r:id="rId20"/>
+    <p:sldId id="282" r:id="rId21"/>
+    <p:sldId id="275" r:id="rId22"/>
+    <p:sldId id="276" r:id="rId23"/>
   </p:sldIdLst>
   <p:sldSz cx="12192000" cy="6858000"/>
   <p:notesSz cx="6858000" cy="9144000"/>
@@ -1190,6 +1195,59 @@
             <a:endParaRPr lang="en-GB" baseline="0" dirty="0" smtClean="0"/>
           </a:p>
           <a:p>
+            <a:endParaRPr lang="en-GB" baseline="0" dirty="0" smtClean="0"/>
+          </a:p>
+          <a:p>
+            <a:r>
+              <a:rPr lang="en-GB" baseline="0" dirty="0" smtClean="0"/>
+              <a:t>Encrypted and Stored on the </a:t>
+            </a:r>
+            <a:r>
+              <a:rPr lang="en-GB" baseline="0" dirty="0" err="1" smtClean="0"/>
+              <a:t>blockchain</a:t>
+            </a:r>
+            <a:endParaRPr lang="en-GB" baseline="0" dirty="0" smtClean="0"/>
+          </a:p>
+          <a:p>
+            <a:r>
+              <a:rPr lang="en-GB" baseline="0" dirty="0" smtClean="0"/>
+              <a:t>To append a new block of data (the code for the execution of a SC)  to the </a:t>
+            </a:r>
+            <a:r>
+              <a:rPr lang="en-GB" baseline="0" dirty="0" err="1" smtClean="0"/>
+              <a:t>blockchain</a:t>
+            </a:r>
+            <a:r>
+              <a:rPr lang="en-GB" baseline="0" dirty="0" smtClean="0"/>
+              <a:t>, the miners have to validate the </a:t>
+            </a:r>
+            <a:r>
+              <a:rPr lang="en-GB" baseline="0" dirty="0" err="1" smtClean="0"/>
+              <a:t>exectuion</a:t>
+            </a:r>
+            <a:r>
+              <a:rPr lang="en-GB" baseline="0" dirty="0" smtClean="0"/>
+              <a:t> of the SC</a:t>
+            </a:r>
+          </a:p>
+          <a:p>
+            <a:r>
+              <a:rPr lang="en-GB" baseline="0" dirty="0" smtClean="0"/>
+              <a:t>SC are stored on the </a:t>
+            </a:r>
+            <a:r>
+              <a:rPr lang="en-GB" baseline="0" dirty="0" err="1" smtClean="0"/>
+              <a:t>blockchain</a:t>
+            </a:r>
+            <a:r>
+              <a:rPr lang="en-GB" baseline="0" dirty="0" smtClean="0"/>
+              <a:t> which all parties have a copy of and if any party fails the system continues to functions with no loss of data or integrity</a:t>
+            </a:r>
+          </a:p>
+          <a:p>
+            <a:endParaRPr lang="en-GB" baseline="0" dirty="0" smtClean="0"/>
+          </a:p>
+          <a:p>
             <a:endParaRPr lang="en-GB" dirty="0"/>
           </a:p>
         </p:txBody>
@@ -1274,6 +1332,30 @@
           <a:bodyPr/>
           <a:lstStyle/>
           <a:p>
+            <a:r>
+              <a:rPr lang="en-GB" dirty="0" smtClean="0"/>
+              <a:t>1. Alice wants</a:t>
+            </a:r>
+            <a:r>
+              <a:rPr lang="en-GB" baseline="0" dirty="0" smtClean="0"/>
+              <a:t> to buy a </a:t>
+            </a:r>
+            <a:r>
+              <a:rPr lang="en-GB" baseline="0" dirty="0" err="1" smtClean="0"/>
+              <a:t>SmartPhone</a:t>
+            </a:r>
+            <a:r>
+              <a:rPr lang="en-GB" baseline="0" dirty="0" smtClean="0"/>
+              <a:t> on </a:t>
+            </a:r>
+            <a:r>
+              <a:rPr lang="en-GB" baseline="0" dirty="0" err="1" smtClean="0"/>
+              <a:t>Ebay</a:t>
+            </a:r>
+            <a:r>
+              <a:rPr lang="en-GB" baseline="0" dirty="0" smtClean="0"/>
+              <a:t>. She is willing to pay a certain amount of money for it. </a:t>
+            </a:r>
             <a:endParaRPr lang="en-GB" dirty="0"/>
           </a:p>
         </p:txBody>
@@ -1304,7 +1386,7 @@
     </p:spTree>
     <p:extLst>
       <p:ext uri="{BB962C8B-B14F-4D97-AF65-F5344CB8AC3E}">
-        <p14:creationId xmlns:p14="http://schemas.microsoft.com/office/powerpoint/2010/main" val="690545035"/>
+        <p14:creationId xmlns:p14="http://schemas.microsoft.com/office/powerpoint/2010/main" val="1362834840"/>
       </p:ext>
     </p:extLst>
   </p:cSld>
@@ -1358,15 +1440,34 @@
           <a:bodyPr/>
           <a:lstStyle/>
           <a:p>
+            <a:pPr marL="228600" indent="-228600">
+              <a:buAutoNum type="arabicPeriod"/>
+            </a:pPr>
             <a:r>
               <a:rPr lang="en-GB" dirty="0" smtClean="0"/>
-              <a:t>Thi</a:t>
+              <a:t>For buying the smart phone, </a:t>
+            </a:r>
+            <a:r>
+              <a:rPr lang="en-GB" dirty="0" err="1" smtClean="0"/>
+              <a:t>alice</a:t>
+            </a:r>
+            <a:r>
+              <a:rPr lang="en-GB" dirty="0" smtClean="0"/>
+              <a:t> wants</a:t>
             </a:r>
             <a:r>
               <a:rPr lang="en-GB" baseline="0" dirty="0" smtClean="0"/>
-              <a:t>nk of it as wills and contract that execute themselves </a:t>
-            </a:r>
-            <a:endParaRPr lang="en-GB" dirty="0"/>
+              <a:t> to make sure that she would get the product she is paying for. Therefore, she stipulates a TRADITIONAL contract with Bob, an </a:t>
+            </a:r>
+            <a:r>
+              <a:rPr lang="en-GB" baseline="0" dirty="0" err="1" smtClean="0"/>
+              <a:t>Ebay</a:t>
+            </a:r>
+            <a:r>
+              <a:rPr lang="en-GB" baseline="0" dirty="0" smtClean="0"/>
+              <a:t> employee who works in the legal area. </a:t>
+            </a:r>
+            <a:endParaRPr lang="en-GB" baseline="0" dirty="0"/>
           </a:p>
         </p:txBody>
       </p:sp>
@@ -1388,6 +1489,781 @@
             <a:fld id="{595F61C2-6B96-DC49-8037-CB49B5317E27}" type="slidenum">
               <a:rPr lang="en-GB" smtClean="0"/>
               <a:t>17</a:t>
+            </a:fld>
+            <a:endParaRPr lang="en-GB"/>
+          </a:p>
+        </p:txBody>
+      </p:sp>
+    </p:spTree>
+    <p:extLst>
+      <p:ext uri="{BB962C8B-B14F-4D97-AF65-F5344CB8AC3E}">
+        <p14:creationId xmlns:p14="http://schemas.microsoft.com/office/powerpoint/2010/main" val="403681562"/>
+      </p:ext>
+    </p:extLst>
+  </p:cSld>
+  <p:clrMapOvr>
+    <a:masterClrMapping/>
+  </p:clrMapOvr>
+</p:notes>
+</file>
+
+<file path=ppt/notesSlides/notesSlide15.xml><?xml version="1.0" encoding="utf-8"?>
+<p:notes xmlns:a="http://schemas.openxmlformats.org/drawingml/2006/main" xmlns:r="http://schemas.openxmlformats.org/officeDocument/2006/relationships" xmlns:p="http://schemas.openxmlformats.org/presentationml/2006/main">
+  <p:cSld>
+    <p:spTree>
+      <p:nvGrpSpPr>
+        <p:cNvPr id="1" name=""/>
+        <p:cNvGrpSpPr/>
+        <p:nvPr/>
+      </p:nvGrpSpPr>
+      <p:grpSpPr>
+        <a:xfrm>
+          <a:off x="0" y="0"/>
+          <a:ext cx="0" cy="0"/>
+          <a:chOff x="0" y="0"/>
+          <a:chExt cx="0" cy="0"/>
+        </a:xfrm>
+      </p:grpSpPr>
+      <p:sp>
+        <p:nvSpPr>
+          <p:cNvPr id="2" name="Segnaposto immagine diapositiva 1"/>
+          <p:cNvSpPr>
+            <a:spLocks noGrp="1" noRot="1" noChangeAspect="1"/>
+          </p:cNvSpPr>
+          <p:nvPr>
+            <p:ph type="sldImg"/>
+          </p:nvPr>
+        </p:nvSpPr>
+        <p:spPr/>
+      </p:sp>
+      <p:sp>
+        <p:nvSpPr>
+          <p:cNvPr id="3" name="Segnaposto note 2"/>
+          <p:cNvSpPr>
+            <a:spLocks noGrp="1"/>
+          </p:cNvSpPr>
+          <p:nvPr>
+            <p:ph type="body" idx="1"/>
+          </p:nvPr>
+        </p:nvSpPr>
+        <p:spPr/>
+        <p:txBody>
+          <a:bodyPr/>
+          <a:lstStyle/>
+          <a:p>
+            <a:pPr marL="228600" indent="-228600">
+              <a:buAutoNum type="arabicPeriod"/>
+            </a:pPr>
+            <a:r>
+              <a:rPr lang="en-GB" baseline="0" dirty="0" smtClean="0"/>
+              <a:t>On the </a:t>
+            </a:r>
+            <a:r>
+              <a:rPr lang="en-GB" baseline="0" dirty="0" err="1" smtClean="0"/>
+              <a:t>tradictional</a:t>
+            </a:r>
+            <a:r>
+              <a:rPr lang="en-GB" baseline="0" dirty="0" smtClean="0"/>
+              <a:t> contract there are the following agreements:</a:t>
+            </a:r>
+          </a:p>
+          <a:p>
+            <a:pPr marL="0" indent="0" algn="l">
+              <a:buNone/>
+            </a:pPr>
+            <a:endParaRPr lang="en-GB" baseline="0" dirty="0" smtClean="0"/>
+          </a:p>
+          <a:p>
+            <a:pPr marL="0" indent="0" algn="l">
+              <a:buNone/>
+            </a:pPr>
+            <a:r>
+              <a:rPr lang="en-GB" baseline="0" dirty="0" smtClean="0"/>
+              <a:t>The Phone will be shipped to Alice only once the money transaction has been confirmed. </a:t>
+            </a:r>
+          </a:p>
+          <a:p>
+            <a:pPr marL="0" indent="0" algn="l">
+              <a:buNone/>
+            </a:pPr>
+            <a:r>
+              <a:rPr lang="en-GB" baseline="0" dirty="0" smtClean="0"/>
+              <a:t>The middleman Bob, is in charge of checking whether the payment has really been made. </a:t>
+            </a:r>
+          </a:p>
+          <a:p>
+            <a:pPr marL="0" indent="0" algn="l">
+              <a:buNone/>
+            </a:pPr>
+            <a:r>
+              <a:rPr lang="en-GB" baseline="0" dirty="0" smtClean="0"/>
+              <a:t>If not, he waits 1-2 days and then he checks the payment again. </a:t>
+            </a:r>
+          </a:p>
+        </p:txBody>
+      </p:sp>
+      <p:sp>
+        <p:nvSpPr>
+          <p:cNvPr id="4" name="Segnaposto numero diapositiva 3"/>
+          <p:cNvSpPr>
+            <a:spLocks noGrp="1"/>
+          </p:cNvSpPr>
+          <p:nvPr>
+            <p:ph type="sldNum" sz="quarter" idx="10"/>
+          </p:nvPr>
+        </p:nvSpPr>
+        <p:spPr/>
+        <p:txBody>
+          <a:bodyPr/>
+          <a:lstStyle/>
+          <a:p>
+            <a:fld id="{595F61C2-6B96-DC49-8037-CB49B5317E27}" type="slidenum">
+              <a:rPr lang="en-GB" smtClean="0"/>
+              <a:t>18</a:t>
+            </a:fld>
+            <a:endParaRPr lang="en-GB"/>
+          </a:p>
+        </p:txBody>
+      </p:sp>
+    </p:spTree>
+    <p:extLst>
+      <p:ext uri="{BB962C8B-B14F-4D97-AF65-F5344CB8AC3E}">
+        <p14:creationId xmlns:p14="http://schemas.microsoft.com/office/powerpoint/2010/main" val="34519891"/>
+      </p:ext>
+    </p:extLst>
+  </p:cSld>
+  <p:clrMapOvr>
+    <a:masterClrMapping/>
+  </p:clrMapOvr>
+</p:notes>
+</file>
+
+<file path=ppt/notesSlides/notesSlide16.xml><?xml version="1.0" encoding="utf-8"?>
+<p:notes xmlns:a="http://schemas.openxmlformats.org/drawingml/2006/main" xmlns:r="http://schemas.openxmlformats.org/officeDocument/2006/relationships" xmlns:p="http://schemas.openxmlformats.org/presentationml/2006/main">
+  <p:cSld>
+    <p:spTree>
+      <p:nvGrpSpPr>
+        <p:cNvPr id="1" name=""/>
+        <p:cNvGrpSpPr/>
+        <p:nvPr/>
+      </p:nvGrpSpPr>
+      <p:grpSpPr>
+        <a:xfrm>
+          <a:off x="0" y="0"/>
+          <a:ext cx="0" cy="0"/>
+          <a:chOff x="0" y="0"/>
+          <a:chExt cx="0" cy="0"/>
+        </a:xfrm>
+      </p:grpSpPr>
+      <p:sp>
+        <p:nvSpPr>
+          <p:cNvPr id="2" name="Segnaposto immagine diapositiva 1"/>
+          <p:cNvSpPr>
+            <a:spLocks noGrp="1" noRot="1" noChangeAspect="1"/>
+          </p:cNvSpPr>
+          <p:nvPr>
+            <p:ph type="sldImg"/>
+          </p:nvPr>
+        </p:nvSpPr>
+        <p:spPr/>
+      </p:sp>
+      <p:sp>
+        <p:nvSpPr>
+          <p:cNvPr id="3" name="Segnaposto note 2"/>
+          <p:cNvSpPr>
+            <a:spLocks noGrp="1"/>
+          </p:cNvSpPr>
+          <p:nvPr>
+            <p:ph type="body" idx="1"/>
+          </p:nvPr>
+        </p:nvSpPr>
+        <p:spPr/>
+        <p:txBody>
+          <a:bodyPr/>
+          <a:lstStyle/>
+          <a:p>
+            <a:pPr marL="457200" lvl="1" indent="0">
+              <a:buNone/>
+            </a:pPr>
+            <a:r>
+              <a:rPr lang="en-GB" baseline="0" dirty="0" smtClean="0"/>
+              <a:t>A better explanation of the contract terms </a:t>
+            </a:r>
+          </a:p>
+          <a:p>
+            <a:pPr marL="628650" lvl="1" indent="-171450">
+              <a:buFontTx/>
+              <a:buChar char="-"/>
+            </a:pPr>
+            <a:r>
+              <a:rPr lang="en-GB" baseline="0" dirty="0" smtClean="0"/>
+              <a:t>Alice pays for her Smartphone on a certain day</a:t>
+            </a:r>
+          </a:p>
+          <a:p>
+            <a:pPr marL="628650" lvl="1" indent="-171450">
+              <a:buFontTx/>
+              <a:buChar char="-"/>
+            </a:pPr>
+            <a:r>
+              <a:rPr lang="en-GB" baseline="0" dirty="0" smtClean="0"/>
+              <a:t>Bob, </a:t>
+            </a:r>
+            <a:r>
+              <a:rPr lang="en-GB" baseline="0" dirty="0" err="1" smtClean="0"/>
+              <a:t>doesn</a:t>
+            </a:r>
+            <a:r>
+              <a:rPr lang="uk-UA" baseline="0" dirty="0" smtClean="0"/>
+              <a:t>’</a:t>
+            </a:r>
+            <a:r>
+              <a:rPr lang="en-GB" baseline="0" dirty="0" smtClean="0"/>
+              <a:t>t know when Alice actually paid for her Smartphone. Therefore he checks the payment once in a while. </a:t>
+            </a:r>
+          </a:p>
+          <a:p>
+            <a:pPr marL="628650" lvl="1" indent="-171450">
+              <a:buFontTx/>
+              <a:buChar char="-"/>
+            </a:pPr>
+            <a:r>
+              <a:rPr lang="en-GB" baseline="0" dirty="0" smtClean="0"/>
+              <a:t>Might be possible that Alice’s money is already been transferred, but Bob will check it a couple of days later.  </a:t>
+            </a:r>
+          </a:p>
+          <a:p>
+            <a:pPr marL="457200" lvl="1" indent="0">
+              <a:buNone/>
+            </a:pPr>
+            <a:r>
+              <a:rPr lang="en-GB" baseline="0" dirty="0" smtClean="0"/>
+              <a:t>- When the payment is confirmed by Bob, the Smartphone will be shipped to Alice.  </a:t>
+            </a:r>
+            <a:endParaRPr lang="en-GB" baseline="0" dirty="0" smtClean="0"/>
+          </a:p>
+        </p:txBody>
+      </p:sp>
+      <p:sp>
+        <p:nvSpPr>
+          <p:cNvPr id="4" name="Segnaposto numero diapositiva 3"/>
+          <p:cNvSpPr>
+            <a:spLocks noGrp="1"/>
+          </p:cNvSpPr>
+          <p:nvPr>
+            <p:ph type="sldNum" sz="quarter" idx="10"/>
+          </p:nvPr>
+        </p:nvSpPr>
+        <p:spPr/>
+        <p:txBody>
+          <a:bodyPr/>
+          <a:lstStyle/>
+          <a:p>
+            <a:fld id="{595F61C2-6B96-DC49-8037-CB49B5317E27}" type="slidenum">
+              <a:rPr lang="en-GB" smtClean="0"/>
+              <a:t>19</a:t>
+            </a:fld>
+            <a:endParaRPr lang="en-GB"/>
+          </a:p>
+        </p:txBody>
+      </p:sp>
+    </p:spTree>
+    <p:extLst>
+      <p:ext uri="{BB962C8B-B14F-4D97-AF65-F5344CB8AC3E}">
+        <p14:creationId xmlns:p14="http://schemas.microsoft.com/office/powerpoint/2010/main" val="1791793583"/>
+      </p:ext>
+    </p:extLst>
+  </p:cSld>
+  <p:clrMapOvr>
+    <a:masterClrMapping/>
+  </p:clrMapOvr>
+</p:notes>
+</file>
+
+<file path=ppt/notesSlides/notesSlide17.xml><?xml version="1.0" encoding="utf-8"?>
+<p:notes xmlns:a="http://schemas.openxmlformats.org/drawingml/2006/main" xmlns:r="http://schemas.openxmlformats.org/officeDocument/2006/relationships" xmlns:p="http://schemas.openxmlformats.org/presentationml/2006/main">
+  <p:cSld>
+    <p:spTree>
+      <p:nvGrpSpPr>
+        <p:cNvPr id="1" name=""/>
+        <p:cNvGrpSpPr/>
+        <p:nvPr/>
+      </p:nvGrpSpPr>
+      <p:grpSpPr>
+        <a:xfrm>
+          <a:off x="0" y="0"/>
+          <a:ext cx="0" cy="0"/>
+          <a:chOff x="0" y="0"/>
+          <a:chExt cx="0" cy="0"/>
+        </a:xfrm>
+      </p:grpSpPr>
+      <p:sp>
+        <p:nvSpPr>
+          <p:cNvPr id="2" name="Segnaposto immagine diapositiva 1"/>
+          <p:cNvSpPr>
+            <a:spLocks noGrp="1" noRot="1" noChangeAspect="1"/>
+          </p:cNvSpPr>
+          <p:nvPr>
+            <p:ph type="sldImg"/>
+          </p:nvPr>
+        </p:nvSpPr>
+        <p:spPr/>
+      </p:sp>
+      <p:sp>
+        <p:nvSpPr>
+          <p:cNvPr id="3" name="Segnaposto note 2"/>
+          <p:cNvSpPr>
+            <a:spLocks noGrp="1"/>
+          </p:cNvSpPr>
+          <p:nvPr>
+            <p:ph type="body" idx="1"/>
+          </p:nvPr>
+        </p:nvSpPr>
+        <p:spPr/>
+        <p:txBody>
+          <a:bodyPr/>
+          <a:lstStyle/>
+          <a:p>
+            <a:pPr marL="457200" lvl="1" indent="0">
+              <a:buNone/>
+            </a:pPr>
+            <a:r>
+              <a:rPr lang="en-GB" baseline="0" dirty="0" smtClean="0"/>
+              <a:t>A better explanation of the contract terms </a:t>
+            </a:r>
+          </a:p>
+          <a:p>
+            <a:pPr marL="628650" lvl="1" indent="-171450">
+              <a:buFontTx/>
+              <a:buChar char="-"/>
+            </a:pPr>
+            <a:r>
+              <a:rPr lang="en-GB" baseline="0" dirty="0" smtClean="0"/>
+              <a:t>Alice pays for her Smartphone on a certain day</a:t>
+            </a:r>
+          </a:p>
+          <a:p>
+            <a:pPr marL="628650" lvl="1" indent="-171450">
+              <a:buFontTx/>
+              <a:buChar char="-"/>
+            </a:pPr>
+            <a:r>
+              <a:rPr lang="en-GB" baseline="0" dirty="0" smtClean="0"/>
+              <a:t>Bob, </a:t>
+            </a:r>
+            <a:r>
+              <a:rPr lang="en-GB" baseline="0" dirty="0" err="1" smtClean="0"/>
+              <a:t>doesn</a:t>
+            </a:r>
+            <a:r>
+              <a:rPr lang="uk-UA" baseline="0" dirty="0" smtClean="0"/>
+              <a:t>’</a:t>
+            </a:r>
+            <a:r>
+              <a:rPr lang="en-GB" baseline="0" dirty="0" smtClean="0"/>
+              <a:t>t know when Alice actually paid for her Smartphone. Therefore he checks the payment once in a while. </a:t>
+            </a:r>
+          </a:p>
+          <a:p>
+            <a:pPr marL="628650" lvl="1" indent="-171450">
+              <a:buFontTx/>
+              <a:buChar char="-"/>
+            </a:pPr>
+            <a:r>
+              <a:rPr lang="en-GB" baseline="0" dirty="0" smtClean="0"/>
+              <a:t>Might be possible that Alice’s money is already been transferred, but Bob will check it a couple of days later.  </a:t>
+            </a:r>
+          </a:p>
+          <a:p>
+            <a:pPr marL="457200" lvl="1" indent="0">
+              <a:buNone/>
+            </a:pPr>
+            <a:r>
+              <a:rPr lang="en-GB" baseline="0" dirty="0" smtClean="0"/>
+              <a:t>- When the </a:t>
+            </a:r>
+            <a:r>
+              <a:rPr lang="en-GB" baseline="0" smtClean="0"/>
+              <a:t>payment is confirmed by Bob, </a:t>
+            </a:r>
+            <a:r>
+              <a:rPr lang="en-GB" baseline="0" dirty="0" smtClean="0"/>
+              <a:t>the Smartphone will be shipped to Alice.  </a:t>
+            </a:r>
+            <a:endParaRPr lang="en-GB" baseline="0" dirty="0" smtClean="0"/>
+          </a:p>
+        </p:txBody>
+      </p:sp>
+      <p:sp>
+        <p:nvSpPr>
+          <p:cNvPr id="4" name="Segnaposto numero diapositiva 3"/>
+          <p:cNvSpPr>
+            <a:spLocks noGrp="1"/>
+          </p:cNvSpPr>
+          <p:nvPr>
+            <p:ph type="sldNum" sz="quarter" idx="10"/>
+          </p:nvPr>
+        </p:nvSpPr>
+        <p:spPr/>
+        <p:txBody>
+          <a:bodyPr/>
+          <a:lstStyle/>
+          <a:p>
+            <a:fld id="{595F61C2-6B96-DC49-8037-CB49B5317E27}" type="slidenum">
+              <a:rPr lang="en-GB" smtClean="0"/>
+              <a:t>20</a:t>
+            </a:fld>
+            <a:endParaRPr lang="en-GB"/>
+          </a:p>
+        </p:txBody>
+      </p:sp>
+    </p:spTree>
+    <p:extLst>
+      <p:ext uri="{BB962C8B-B14F-4D97-AF65-F5344CB8AC3E}">
+        <p14:creationId xmlns:p14="http://schemas.microsoft.com/office/powerpoint/2010/main" val="1703072189"/>
+      </p:ext>
+    </p:extLst>
+  </p:cSld>
+  <p:clrMapOvr>
+    <a:masterClrMapping/>
+  </p:clrMapOvr>
+</p:notes>
+</file>
+
+<file path=ppt/notesSlides/notesSlide18.xml><?xml version="1.0" encoding="utf-8"?>
+<p:notes xmlns:a="http://schemas.openxmlformats.org/drawingml/2006/main" xmlns:r="http://schemas.openxmlformats.org/officeDocument/2006/relationships" xmlns:p="http://schemas.openxmlformats.org/presentationml/2006/main">
+  <p:cSld>
+    <p:spTree>
+      <p:nvGrpSpPr>
+        <p:cNvPr id="1" name=""/>
+        <p:cNvGrpSpPr/>
+        <p:nvPr/>
+      </p:nvGrpSpPr>
+      <p:grpSpPr>
+        <a:xfrm>
+          <a:off x="0" y="0"/>
+          <a:ext cx="0" cy="0"/>
+          <a:chOff x="0" y="0"/>
+          <a:chExt cx="0" cy="0"/>
+        </a:xfrm>
+      </p:grpSpPr>
+      <p:sp>
+        <p:nvSpPr>
+          <p:cNvPr id="2" name="Segnaposto immagine diapositiva 1"/>
+          <p:cNvSpPr>
+            <a:spLocks noGrp="1" noRot="1" noChangeAspect="1"/>
+          </p:cNvSpPr>
+          <p:nvPr>
+            <p:ph type="sldImg"/>
+          </p:nvPr>
+        </p:nvSpPr>
+        <p:spPr/>
+      </p:sp>
+      <p:sp>
+        <p:nvSpPr>
+          <p:cNvPr id="3" name="Segnaposto note 2"/>
+          <p:cNvSpPr>
+            <a:spLocks noGrp="1"/>
+          </p:cNvSpPr>
+          <p:nvPr>
+            <p:ph type="body" idx="1"/>
+          </p:nvPr>
+        </p:nvSpPr>
+        <p:spPr/>
+        <p:txBody>
+          <a:bodyPr/>
+          <a:lstStyle/>
+          <a:p>
+            <a:r>
+              <a:rPr lang="en-GB" dirty="0" smtClean="0"/>
+              <a:t>http://</a:t>
+            </a:r>
+            <a:r>
+              <a:rPr lang="en-GB" dirty="0" err="1" smtClean="0"/>
+              <a:t>www.pwc.com</a:t>
+            </a:r>
+            <a:r>
+              <a:rPr lang="en-GB" dirty="0" smtClean="0"/>
+              <a:t>/us/</a:t>
+            </a:r>
+            <a:r>
+              <a:rPr lang="en-GB" dirty="0" err="1" smtClean="0"/>
+              <a:t>en</a:t>
+            </a:r>
+            <a:r>
+              <a:rPr lang="en-GB" dirty="0" smtClean="0"/>
+              <a:t>/technology-forecast/</a:t>
+            </a:r>
+            <a:r>
+              <a:rPr lang="en-GB" dirty="0" err="1" smtClean="0"/>
+              <a:t>blockchain</a:t>
+            </a:r>
+            <a:r>
+              <a:rPr lang="en-GB" dirty="0" smtClean="0"/>
+              <a:t>/digital-</a:t>
+            </a:r>
+            <a:r>
+              <a:rPr lang="en-GB" dirty="0" err="1" smtClean="0"/>
+              <a:t>business.html</a:t>
+            </a:r>
+            <a:endParaRPr lang="en-GB" dirty="0" smtClean="0"/>
+          </a:p>
+          <a:p>
+            <a:endParaRPr lang="en-GB" dirty="0" smtClean="0"/>
+          </a:p>
+          <a:p>
+            <a:endParaRPr lang="en-GB" dirty="0" smtClean="0"/>
+          </a:p>
+          <a:p>
+            <a:pPr marL="228600" indent="-228600">
+              <a:buAutoNum type="arabicPeriod"/>
+            </a:pPr>
+            <a:r>
+              <a:rPr lang="en-GB" baseline="0" dirty="0" smtClean="0"/>
+              <a:t>The execution of a smart contract </a:t>
+            </a:r>
+            <a:r>
+              <a:rPr lang="en-GB" baseline="0" dirty="0" err="1" smtClean="0"/>
+              <a:t>doensn’t</a:t>
+            </a:r>
+            <a:r>
+              <a:rPr lang="en-GB" baseline="0" dirty="0" smtClean="0"/>
+              <a:t> need a middleman, which mean that can be executed faster </a:t>
+            </a:r>
+          </a:p>
+          <a:p>
+            <a:pPr marL="228600" indent="-228600">
+              <a:buAutoNum type="arabicPeriod"/>
+            </a:pPr>
+            <a:endParaRPr lang="en-GB" baseline="0" dirty="0" smtClean="0"/>
+          </a:p>
+          <a:p>
+            <a:pPr marL="228600" indent="-228600">
+              <a:buAutoNum type="arabicPeriod"/>
+            </a:pPr>
+            <a:r>
+              <a:rPr lang="en-GB" baseline="0" dirty="0" smtClean="0"/>
+              <a:t>Manual remittance: consider the following scenario: Alice wants to buy a product from </a:t>
+            </a:r>
+            <a:r>
+              <a:rPr lang="en-GB" baseline="0" dirty="0" err="1" smtClean="0"/>
+              <a:t>Ebay</a:t>
+            </a:r>
+            <a:r>
+              <a:rPr lang="en-GB" baseline="0" dirty="0" smtClean="0"/>
+              <a:t>. Let’s suppose that she has stipulated a smart contract with an </a:t>
+            </a:r>
+            <a:r>
+              <a:rPr lang="en-GB" baseline="0" dirty="0" err="1" smtClean="0"/>
+              <a:t>Ebay</a:t>
+            </a:r>
+            <a:r>
+              <a:rPr lang="en-GB" baseline="0" dirty="0" smtClean="0"/>
+              <a:t> agent. Inside the smart contract there is an agreement, that says “When the payment is confirmed, the product will automatically be shipped”. If it were a traditional contract, the </a:t>
+            </a:r>
+            <a:r>
+              <a:rPr lang="en-GB" baseline="0" dirty="0" err="1" smtClean="0"/>
+              <a:t>Ebay</a:t>
+            </a:r>
+            <a:r>
+              <a:rPr lang="en-GB" baseline="0" dirty="0" smtClean="0"/>
+              <a:t> agent should check that the payment has been really done. The process would not be automatic like in the smart contract. </a:t>
+            </a:r>
+          </a:p>
+          <a:p>
+            <a:pPr marL="228600" indent="-228600">
+              <a:buAutoNum type="arabicPeriod"/>
+            </a:pPr>
+            <a:endParaRPr lang="en-GB" baseline="0" dirty="0" smtClean="0"/>
+          </a:p>
+          <a:p>
+            <a:pPr marL="228600" indent="-228600">
+              <a:buAutoNum type="arabicPeriod"/>
+            </a:pPr>
+            <a:r>
+              <a:rPr lang="en-GB" dirty="0" smtClean="0"/>
+              <a:t>A Smart Contract is for sure cheaper</a:t>
+            </a:r>
+            <a:r>
+              <a:rPr lang="en-GB" baseline="0" dirty="0" smtClean="0"/>
+              <a:t> than a traditional one. You don’t have to pay for a middleman who checks the agreements, you have only to pay the ”code”.</a:t>
+            </a:r>
+          </a:p>
+          <a:p>
+            <a:pPr marL="228600" indent="-228600">
+              <a:buAutoNum type="arabicPeriod"/>
+            </a:pPr>
+            <a:r>
+              <a:rPr lang="en-GB" baseline="0" dirty="0" smtClean="0"/>
+              <a:t>A Smart Contract cannot get lost and its always available in chronological order on the </a:t>
+            </a:r>
+            <a:r>
+              <a:rPr lang="en-GB" baseline="0" dirty="0" err="1" smtClean="0"/>
+              <a:t>blockchain</a:t>
+            </a:r>
+            <a:r>
+              <a:rPr lang="en-GB" baseline="0" dirty="0" smtClean="0"/>
+              <a:t> for future access </a:t>
+            </a:r>
+          </a:p>
+          <a:p>
+            <a:pPr marL="228600" indent="-228600">
+              <a:buAutoNum type="arabicPeriod"/>
+            </a:pPr>
+            <a:r>
+              <a:rPr lang="en-GB" baseline="0" dirty="0" smtClean="0"/>
+              <a:t>Like said before, there is no need of a middleman (lawyer) </a:t>
+            </a:r>
+          </a:p>
+          <a:p>
+            <a:pPr marL="228600" indent="-228600">
+              <a:buAutoNum type="arabicPeriod"/>
+            </a:pPr>
+            <a:endParaRPr lang="en-GB" baseline="0" dirty="0" smtClean="0"/>
+          </a:p>
+          <a:p>
+            <a:pPr marL="228600" indent="-228600">
+              <a:buAutoNum type="arabicPeriod"/>
+            </a:pPr>
+            <a:endParaRPr lang="en-GB" baseline="0" dirty="0" smtClean="0"/>
+          </a:p>
+          <a:p>
+            <a:pPr marL="0" indent="0">
+              <a:buNone/>
+            </a:pPr>
+            <a:r>
+              <a:rPr lang="en-GB" b="1" baseline="0" dirty="0" smtClean="0"/>
+              <a:t>A Smart contract on a </a:t>
+            </a:r>
+            <a:r>
+              <a:rPr lang="en-GB" b="1" baseline="0" dirty="0" err="1" smtClean="0"/>
+              <a:t>blockchain</a:t>
+            </a:r>
+            <a:r>
+              <a:rPr lang="en-GB" b="1" baseline="0" dirty="0" smtClean="0"/>
+              <a:t> is like a single large secure Computer System BUT without the risks, costs and trust issues of a centralised model </a:t>
+            </a:r>
+          </a:p>
+        </p:txBody>
+      </p:sp>
+      <p:sp>
+        <p:nvSpPr>
+          <p:cNvPr id="4" name="Segnaposto numero diapositiva 3"/>
+          <p:cNvSpPr>
+            <a:spLocks noGrp="1"/>
+          </p:cNvSpPr>
+          <p:nvPr>
+            <p:ph type="sldNum" sz="quarter" idx="10"/>
+          </p:nvPr>
+        </p:nvSpPr>
+        <p:spPr/>
+        <p:txBody>
+          <a:bodyPr/>
+          <a:lstStyle/>
+          <a:p>
+            <a:fld id="{595F61C2-6B96-DC49-8037-CB49B5317E27}" type="slidenum">
+              <a:rPr lang="en-GB" smtClean="0"/>
+              <a:t>21</a:t>
+            </a:fld>
+            <a:endParaRPr lang="en-GB"/>
+          </a:p>
+        </p:txBody>
+      </p:sp>
+    </p:spTree>
+    <p:extLst>
+      <p:ext uri="{BB962C8B-B14F-4D97-AF65-F5344CB8AC3E}">
+        <p14:creationId xmlns:p14="http://schemas.microsoft.com/office/powerpoint/2010/main" val="690545035"/>
+      </p:ext>
+    </p:extLst>
+  </p:cSld>
+  <p:clrMapOvr>
+    <a:masterClrMapping/>
+  </p:clrMapOvr>
+</p:notes>
+</file>
+
+<file path=ppt/notesSlides/notesSlide19.xml><?xml version="1.0" encoding="utf-8"?>
+<p:notes xmlns:a="http://schemas.openxmlformats.org/drawingml/2006/main" xmlns:r="http://schemas.openxmlformats.org/officeDocument/2006/relationships" xmlns:p="http://schemas.openxmlformats.org/presentationml/2006/main">
+  <p:cSld>
+    <p:spTree>
+      <p:nvGrpSpPr>
+        <p:cNvPr id="1" name=""/>
+        <p:cNvGrpSpPr/>
+        <p:nvPr/>
+      </p:nvGrpSpPr>
+      <p:grpSpPr>
+        <a:xfrm>
+          <a:off x="0" y="0"/>
+          <a:ext cx="0" cy="0"/>
+          <a:chOff x="0" y="0"/>
+          <a:chExt cx="0" cy="0"/>
+        </a:xfrm>
+      </p:grpSpPr>
+      <p:sp>
+        <p:nvSpPr>
+          <p:cNvPr id="2" name="Segnaposto immagine diapositiva 1"/>
+          <p:cNvSpPr>
+            <a:spLocks noGrp="1" noRot="1" noChangeAspect="1"/>
+          </p:cNvSpPr>
+          <p:nvPr>
+            <p:ph type="sldImg"/>
+          </p:nvPr>
+        </p:nvSpPr>
+        <p:spPr/>
+      </p:sp>
+      <p:sp>
+        <p:nvSpPr>
+          <p:cNvPr id="3" name="Segnaposto note 2"/>
+          <p:cNvSpPr>
+            <a:spLocks noGrp="1"/>
+          </p:cNvSpPr>
+          <p:nvPr>
+            <p:ph type="body" idx="1"/>
+          </p:nvPr>
+        </p:nvSpPr>
+        <p:spPr/>
+        <p:txBody>
+          <a:bodyPr/>
+          <a:lstStyle/>
+          <a:p>
+            <a:r>
+              <a:rPr lang="en-GB" dirty="0" smtClean="0"/>
+              <a:t>If</a:t>
+            </a:r>
+            <a:r>
+              <a:rPr lang="en-GB" baseline="0" dirty="0" smtClean="0"/>
+              <a:t> any party tries to change a contract (the execution code) on the </a:t>
+            </a:r>
+            <a:r>
+              <a:rPr lang="en-GB" baseline="0" dirty="0" err="1" smtClean="0"/>
+              <a:t>blockchain</a:t>
+            </a:r>
+            <a:r>
+              <a:rPr lang="en-GB" baseline="0" dirty="0" smtClean="0"/>
+              <a:t> all other parties can detect and prevent it</a:t>
+            </a:r>
+            <a:endParaRPr lang="en-GB" dirty="0"/>
+          </a:p>
+        </p:txBody>
+      </p:sp>
+      <p:sp>
+        <p:nvSpPr>
+          <p:cNvPr id="4" name="Segnaposto numero diapositiva 3"/>
+          <p:cNvSpPr>
+            <a:spLocks noGrp="1"/>
+          </p:cNvSpPr>
+          <p:nvPr>
+            <p:ph type="sldNum" sz="quarter" idx="10"/>
+          </p:nvPr>
+        </p:nvSpPr>
+        <p:spPr/>
+        <p:txBody>
+          <a:bodyPr/>
+          <a:lstStyle/>
+          <a:p>
+            <a:fld id="{595F61C2-6B96-DC49-8037-CB49B5317E27}" type="slidenum">
+              <a:rPr lang="en-GB" smtClean="0"/>
+              <a:t>22</a:t>
             </a:fld>
             <a:endParaRPr lang="en-GB"/>
           </a:p>
@@ -10137,7 +11013,7 @@
               <a:rPr lang="en-GB" sz="4000" dirty="0" smtClean="0">
                 <a:latin typeface="+mj-lt"/>
               </a:rPr>
-              <a:t>How are they executed?</a:t>
+              <a:t>What goes into a Smart Contract?</a:t>
             </a:r>
           </a:p>
           <a:p>
@@ -10622,7 +11498,7 @@
         </p:nvSpPr>
         <p:spPr>
           <a:xfrm>
-            <a:off x="824346" y="1018601"/>
+            <a:off x="824347" y="1245094"/>
             <a:ext cx="10131425" cy="4557560"/>
           </a:xfrm>
           <a:prstGeom prst="rect">
@@ -10856,6 +11732,20 @@
                 <a:latin typeface="+mj-lt"/>
               </a:rPr>
               <a:t>It automatically verifies itself and executes the terms contained inside it</a:t>
+            </a:r>
+          </a:p>
+          <a:p>
+            <a:r>
+              <a:rPr lang="en-GB" sz="4000" dirty="0" smtClean="0">
+                <a:latin typeface="+mj-lt"/>
+              </a:rPr>
+              <a:t>Stored on the </a:t>
+            </a:r>
+            <a:r>
+              <a:rPr lang="en-GB" sz="4000" dirty="0" err="1" smtClean="0">
+                <a:latin typeface="+mj-lt"/>
+              </a:rPr>
+              <a:t>Blockchain</a:t>
             </a:r>
             <a:endParaRPr lang="en-GB" sz="4000" dirty="0">
               <a:latin typeface="+mj-lt"/>
@@ -10942,44 +11832,6 @@
           <a:chExt cx="0" cy="0"/>
         </a:xfrm>
       </p:grpSpPr>
-      <p:sp>
-        <p:nvSpPr>
-          <p:cNvPr id="5" name="Segnaposto contenuto 2"/>
-          <p:cNvSpPr>
-            <a:spLocks noGrp="1"/>
-          </p:cNvSpPr>
-          <p:nvPr>
-            <p:ph idx="1"/>
-          </p:nvPr>
-        </p:nvSpPr>
-        <p:spPr>
-          <a:xfrm>
-            <a:off x="671947" y="1850167"/>
-            <a:ext cx="10131425" cy="4557560"/>
-          </a:xfrm>
-        </p:spPr>
-        <p:txBody>
-          <a:bodyPr>
-            <a:normAutofit/>
-          </a:bodyPr>
-          <a:lstStyle/>
-          <a:p>
-            <a:endParaRPr lang="en-GB" sz="4000" dirty="0" smtClean="0">
-              <a:latin typeface="+mj-lt"/>
-            </a:endParaRPr>
-          </a:p>
-          <a:p>
-            <a:endParaRPr lang="en-GB" sz="4000" dirty="0" smtClean="0">
-              <a:latin typeface="+mj-lt"/>
-            </a:endParaRPr>
-          </a:p>
-          <a:p>
-            <a:endParaRPr lang="en-GB" sz="4000" dirty="0">
-              <a:latin typeface="+mj-lt"/>
-            </a:endParaRPr>
-          </a:p>
-        </p:txBody>
-      </p:sp>
       <p:pic>
         <p:nvPicPr>
           <p:cNvPr id="2" name="Immagine 1"/>
@@ -11003,7 +11855,7 @@
         </p:blipFill>
         <p:spPr>
           <a:xfrm>
-            <a:off x="-844117" y="0"/>
+            <a:off x="-758392" y="0"/>
             <a:ext cx="14025600" cy="7012800"/>
           </a:xfrm>
           <a:prstGeom prst="rect">
@@ -11013,55 +11865,93 @@
       </p:pic>
       <p:sp>
         <p:nvSpPr>
-          <p:cNvPr id="7" name="Titolo 1"/>
+          <p:cNvPr id="5" name="Segnaposto contenuto 2"/>
           <p:cNvSpPr>
             <a:spLocks noGrp="1"/>
           </p:cNvSpPr>
           <p:nvPr>
-            <p:ph type="title"/>
-          </p:nvPr>
-        </p:nvSpPr>
-        <p:spPr>
-          <a:xfrm>
-            <a:off x="387927" y="484909"/>
-            <a:ext cx="11804073" cy="1067385"/>
+            <p:ph idx="1"/>
+          </p:nvPr>
+        </p:nvSpPr>
+        <p:spPr>
+          <a:xfrm>
+            <a:off x="671947" y="1850167"/>
+            <a:ext cx="10131425" cy="4557560"/>
           </a:xfrm>
         </p:spPr>
         <p:txBody>
           <a:bodyPr>
-            <a:noAutofit/>
+            <a:normAutofit/>
           </a:bodyPr>
           <a:lstStyle/>
           <a:p>
-            <a:pPr marL="742950" indent="-742950" defTabSz="914400">
+            <a:endParaRPr lang="en-GB" sz="4000" dirty="0" smtClean="0">
+              <a:latin typeface="+mj-lt"/>
+            </a:endParaRPr>
+          </a:p>
+          <a:p>
+            <a:endParaRPr lang="en-GB" sz="4000" dirty="0" smtClean="0">
+              <a:latin typeface="+mj-lt"/>
+            </a:endParaRPr>
+          </a:p>
+          <a:p>
+            <a:endParaRPr lang="en-GB" sz="4000" dirty="0">
+              <a:latin typeface="+mj-lt"/>
+            </a:endParaRPr>
+          </a:p>
+        </p:txBody>
+      </p:sp>
+      <p:sp>
+        <p:nvSpPr>
+          <p:cNvPr id="7" name="Titolo 1"/>
+          <p:cNvSpPr>
+            <a:spLocks noGrp="1"/>
+          </p:cNvSpPr>
+          <p:nvPr>
+            <p:ph type="title"/>
+          </p:nvPr>
+        </p:nvSpPr>
+        <p:spPr>
+          <a:xfrm>
+            <a:off x="387927" y="484909"/>
+            <a:ext cx="10131425" cy="1067385"/>
+          </a:xfrm>
+        </p:spPr>
+        <p:txBody>
+          <a:bodyPr>
+            <a:normAutofit/>
+          </a:bodyPr>
+          <a:lstStyle/>
+          <a:p>
+            <a:pPr marL="742950" marR="0" lvl="0" indent="-742950" defTabSz="914400" eaLnBrk="1" fontAlgn="auto" latinLnBrk="0" hangingPunct="1">
+              <a:lnSpc>
+                <a:spcPct val="100000"/>
+              </a:lnSpc>
               <a:spcBef>
                 <a:spcPts val="0"/>
               </a:spcBef>
+              <a:spcAft>
+                <a:spcPts val="0"/>
+              </a:spcAft>
+              <a:buClrTx/>
+              <a:buSzTx/>
+              <a:buFont typeface="+mj-lt"/>
+              <a:buNone/>
+              <a:tabLst/>
               <a:defRPr/>
             </a:pPr>
             <a:r>
+              <a:rPr lang="en-GB" dirty="0" smtClean="0"/>
+              <a:t>3.1</a:t>
+            </a:r>
+            <a:r>
+              <a:rPr lang="en-GB" dirty="0" smtClean="0"/>
+              <a:t>	</a:t>
+            </a:r>
+            <a:r>
               <a:rPr lang="en-GB" sz="4000" dirty="0" smtClean="0"/>
-              <a:t>3.2 </a:t>
-            </a:r>
-            <a:r>
-              <a:rPr lang="en-GB" sz="4000" dirty="0"/>
-              <a:t>Traditional </a:t>
-            </a:r>
-            <a:r>
-              <a:rPr lang="en-GB" sz="4000" dirty="0" err="1" smtClean="0"/>
-              <a:t>ContractS</a:t>
-            </a:r>
-            <a:r>
-              <a:rPr lang="en-GB" sz="4000" dirty="0" smtClean="0"/>
-              <a:t> </a:t>
-            </a:r>
-            <a:r>
-              <a:rPr lang="en-GB" sz="4000" dirty="0"/>
-              <a:t>vs. Smart Contracts</a:t>
-            </a:r>
-            <a:br>
-              <a:rPr lang="en-GB" sz="4000" dirty="0"/>
-            </a:br>
+              <a:t>Scenario Example</a:t>
+            </a:r>
             <a:endParaRPr lang="en-GB" sz="4000" dirty="0"/>
           </a:p>
         </p:txBody>
@@ -11313,10 +12203,196 @@
           </a:p>
         </p:txBody>
       </p:sp>
+      <p:cxnSp>
+        <p:nvCxnSpPr>
+          <p:cNvPr id="9" name="Connettore 2 8"/>
+          <p:cNvCxnSpPr/>
+          <p:nvPr/>
+        </p:nvCxnSpPr>
+        <p:spPr>
+          <a:xfrm flipV="1">
+            <a:off x="4645420" y="2891500"/>
+            <a:ext cx="2336613" cy="22342"/>
+          </a:xfrm>
+          <a:prstGeom prst="straightConnector1">
+            <a:avLst/>
+          </a:prstGeom>
+          <a:ln w="57150">
+            <a:tailEnd type="triangle"/>
+          </a:ln>
+        </p:spPr>
+        <p:style>
+          <a:lnRef idx="1">
+            <a:schemeClr val="accent1"/>
+          </a:lnRef>
+          <a:fillRef idx="0">
+            <a:schemeClr val="accent1"/>
+          </a:fillRef>
+          <a:effectRef idx="0">
+            <a:schemeClr val="accent1"/>
+          </a:effectRef>
+          <a:fontRef idx="minor">
+            <a:schemeClr val="tx1"/>
+          </a:fontRef>
+        </p:style>
+      </p:cxnSp>
+      <p:pic>
+        <p:nvPicPr>
+          <p:cNvPr id="10" name="Immagine 9"/>
+          <p:cNvPicPr>
+            <a:picLocks noChangeAspect="1"/>
+          </p:cNvPicPr>
+          <p:nvPr/>
+        </p:nvPicPr>
+        <p:blipFill>
+          <a:blip r:embed="rId4">
+            <a:extLst>
+              <a:ext uri="{28A0092B-C50C-407E-A947-70E740481C1C}">
+                <a14:useLocalDpi xmlns:a14="http://schemas.microsoft.com/office/drawing/2010/main"/>
+              </a:ext>
+            </a:extLst>
+          </a:blip>
+          <a:stretch>
+            <a:fillRect/>
+          </a:stretch>
+        </p:blipFill>
+        <p:spPr>
+          <a:xfrm>
+            <a:off x="1743827" y="2200048"/>
+            <a:ext cx="2174528" cy="2178152"/>
+          </a:xfrm>
+          <a:prstGeom prst="rect">
+            <a:avLst/>
+          </a:prstGeom>
+        </p:spPr>
+      </p:pic>
+      <p:pic>
+        <p:nvPicPr>
+          <p:cNvPr id="3" name="Immagine 2"/>
+          <p:cNvPicPr>
+            <a:picLocks noChangeAspect="1"/>
+          </p:cNvPicPr>
+          <p:nvPr/>
+        </p:nvPicPr>
+        <p:blipFill>
+          <a:blip r:embed="rId5">
+            <a:extLst>
+              <a:ext uri="{28A0092B-C50C-407E-A947-70E740481C1C}">
+                <a14:useLocalDpi xmlns:a14="http://schemas.microsoft.com/office/drawing/2010/main" val="0"/>
+              </a:ext>
+            </a:extLst>
+          </a:blip>
+          <a:stretch>
+            <a:fillRect/>
+          </a:stretch>
+        </p:blipFill>
+        <p:spPr>
+          <a:xfrm>
+            <a:off x="7544638" y="2449301"/>
+            <a:ext cx="4037610" cy="1679646"/>
+          </a:xfrm>
+          <a:prstGeom prst="rect">
+            <a:avLst/>
+          </a:prstGeom>
+        </p:spPr>
+      </p:pic>
+      <p:pic>
+        <p:nvPicPr>
+          <p:cNvPr id="4" name="Immagine 3"/>
+          <p:cNvPicPr>
+            <a:picLocks noChangeAspect="1"/>
+          </p:cNvPicPr>
+          <p:nvPr/>
+        </p:nvPicPr>
+        <p:blipFill>
+          <a:blip r:embed="rId6">
+            <a:extLst>
+              <a:ext uri="{28A0092B-C50C-407E-A947-70E740481C1C}">
+                <a14:useLocalDpi xmlns:a14="http://schemas.microsoft.com/office/drawing/2010/main" val="0"/>
+              </a:ext>
+            </a:extLst>
+          </a:blip>
+          <a:stretch>
+            <a:fillRect/>
+          </a:stretch>
+        </p:blipFill>
+        <p:spPr>
+          <a:xfrm>
+            <a:off x="5266307" y="3979268"/>
+            <a:ext cx="1486962" cy="1387831"/>
+          </a:xfrm>
+          <a:prstGeom prst="rect">
+            <a:avLst/>
+          </a:prstGeom>
+        </p:spPr>
+      </p:pic>
+      <p:cxnSp>
+        <p:nvCxnSpPr>
+          <p:cNvPr id="15" name="Connettore 2 14"/>
+          <p:cNvCxnSpPr/>
+          <p:nvPr/>
+        </p:nvCxnSpPr>
+        <p:spPr>
+          <a:xfrm flipH="1">
+            <a:off x="4544831" y="3823854"/>
+            <a:ext cx="2360933" cy="3014"/>
+          </a:xfrm>
+          <a:prstGeom prst="straightConnector1">
+            <a:avLst/>
+          </a:prstGeom>
+          <a:ln w="57150">
+            <a:tailEnd type="triangle"/>
+          </a:ln>
+        </p:spPr>
+        <p:style>
+          <a:lnRef idx="1">
+            <a:schemeClr val="accent1"/>
+          </a:lnRef>
+          <a:fillRef idx="0">
+            <a:schemeClr val="accent1"/>
+          </a:fillRef>
+          <a:effectRef idx="0">
+            <a:schemeClr val="accent1"/>
+          </a:effectRef>
+          <a:fontRef idx="minor">
+            <a:schemeClr val="tx1"/>
+          </a:fontRef>
+        </p:style>
+      </p:cxnSp>
+      <p:pic>
+        <p:nvPicPr>
+          <p:cNvPr id="18" name="Immagine 17"/>
+          <p:cNvPicPr>
+            <a:picLocks noChangeAspect="1"/>
+          </p:cNvPicPr>
+          <p:nvPr/>
+        </p:nvPicPr>
+        <p:blipFill>
+          <a:blip r:embed="rId7">
+            <a:extLst>
+              <a:ext uri="{28A0092B-C50C-407E-A947-70E740481C1C}">
+                <a14:useLocalDpi xmlns:a14="http://schemas.microsoft.com/office/drawing/2010/main"/>
+              </a:ext>
+            </a:extLst>
+          </a:blip>
+          <a:stretch>
+            <a:fillRect/>
+          </a:stretch>
+        </p:blipFill>
+        <p:spPr>
+          <a:xfrm>
+            <a:off x="5348694" y="1818137"/>
+            <a:ext cx="881361" cy="881361"/>
+          </a:xfrm>
+          <a:prstGeom prst="rect">
+            <a:avLst/>
+          </a:prstGeom>
+        </p:spPr>
+      </p:pic>
     </p:spTree>
     <p:extLst>
       <p:ext uri="{BB962C8B-B14F-4D97-AF65-F5344CB8AC3E}">
-        <p14:creationId xmlns:p14="http://schemas.microsoft.com/office/powerpoint/2010/main" val="2018984926"/>
+        <p14:creationId xmlns:p14="http://schemas.microsoft.com/office/powerpoint/2010/main" val="267127010"/>
       </p:ext>
     </p:extLst>
   </p:cSld>
@@ -11362,44 +12438,6 @@
           <a:chExt cx="0" cy="0"/>
         </a:xfrm>
       </p:grpSpPr>
-      <p:sp>
-        <p:nvSpPr>
-          <p:cNvPr id="5" name="Segnaposto contenuto 2"/>
-          <p:cNvSpPr>
-            <a:spLocks noGrp="1"/>
-          </p:cNvSpPr>
-          <p:nvPr>
-            <p:ph idx="1"/>
-          </p:nvPr>
-        </p:nvSpPr>
-        <p:spPr>
-          <a:xfrm>
-            <a:off x="671947" y="1850167"/>
-            <a:ext cx="10131425" cy="4557560"/>
-          </a:xfrm>
-        </p:spPr>
-        <p:txBody>
-          <a:bodyPr>
-            <a:normAutofit/>
-          </a:bodyPr>
-          <a:lstStyle/>
-          <a:p>
-            <a:endParaRPr lang="en-GB" sz="4000" dirty="0" smtClean="0">
-              <a:latin typeface="+mj-lt"/>
-            </a:endParaRPr>
-          </a:p>
-          <a:p>
-            <a:endParaRPr lang="en-GB" sz="4000" dirty="0" smtClean="0">
-              <a:latin typeface="+mj-lt"/>
-            </a:endParaRPr>
-          </a:p>
-          <a:p>
-            <a:endParaRPr lang="en-GB" sz="4000" dirty="0">
-              <a:latin typeface="+mj-lt"/>
-            </a:endParaRPr>
-          </a:p>
-        </p:txBody>
-      </p:sp>
       <p:pic>
         <p:nvPicPr>
           <p:cNvPr id="2" name="Immagine 1"/>
@@ -11423,7 +12461,7 @@
         </p:blipFill>
         <p:spPr>
           <a:xfrm>
-            <a:off x="-844117" y="0"/>
+            <a:off x="-758392" y="0"/>
             <a:ext cx="14025600" cy="7012800"/>
           </a:xfrm>
           <a:prstGeom prst="rect">
@@ -11433,6 +12471,44 @@
       </p:pic>
       <p:sp>
         <p:nvSpPr>
+          <p:cNvPr id="5" name="Segnaposto contenuto 2"/>
+          <p:cNvSpPr>
+            <a:spLocks noGrp="1"/>
+          </p:cNvSpPr>
+          <p:nvPr>
+            <p:ph idx="1"/>
+          </p:nvPr>
+        </p:nvSpPr>
+        <p:spPr>
+          <a:xfrm>
+            <a:off x="671947" y="1850167"/>
+            <a:ext cx="10131425" cy="4557560"/>
+          </a:xfrm>
+        </p:spPr>
+        <p:txBody>
+          <a:bodyPr>
+            <a:normAutofit/>
+          </a:bodyPr>
+          <a:lstStyle/>
+          <a:p>
+            <a:endParaRPr lang="en-GB" sz="4000" dirty="0" smtClean="0">
+              <a:latin typeface="+mj-lt"/>
+            </a:endParaRPr>
+          </a:p>
+          <a:p>
+            <a:endParaRPr lang="en-GB" sz="4000" dirty="0" smtClean="0">
+              <a:latin typeface="+mj-lt"/>
+            </a:endParaRPr>
+          </a:p>
+          <a:p>
+            <a:endParaRPr lang="en-GB" sz="4000" dirty="0">
+              <a:latin typeface="+mj-lt"/>
+            </a:endParaRPr>
+          </a:p>
+        </p:txBody>
+      </p:sp>
+      <p:sp>
+        <p:nvSpPr>
           <p:cNvPr id="7" name="Titolo 1"/>
           <p:cNvSpPr>
             <a:spLocks noGrp="1"/>
@@ -11448,7 +12524,9 @@
           </a:xfrm>
         </p:spPr>
         <p:txBody>
-          <a:bodyPr/>
+          <a:bodyPr>
+            <a:normAutofit/>
+          </a:bodyPr>
           <a:lstStyle/>
           <a:p>
             <a:pPr marL="742950" marR="0" lvl="0" indent="-742950" defTabSz="914400" eaLnBrk="1" fontAlgn="auto" latinLnBrk="0" hangingPunct="1">
@@ -11478,15 +12556,7 @@
             </a:r>
             <a:r>
               <a:rPr lang="en-GB" sz="4000" dirty="0" smtClean="0"/>
-              <a:t>What is a smart </a:t>
-            </a:r>
-            <a:r>
-              <a:rPr lang="en-GB" sz="4000" dirty="0" err="1" smtClean="0"/>
-              <a:t>contracT</a:t>
-            </a:r>
-            <a:r>
-              <a:rPr lang="en-GB" sz="4000" dirty="0" smtClean="0"/>
-              <a:t>?</a:t>
+              <a:t>Scenario Example</a:t>
             </a:r>
             <a:endParaRPr lang="en-GB" sz="4000" dirty="0"/>
           </a:p>
@@ -11739,10 +12809,1492 @@
           </a:p>
         </p:txBody>
       </p:sp>
+      <p:pic>
+        <p:nvPicPr>
+          <p:cNvPr id="12" name="Immagine 11"/>
+          <p:cNvPicPr>
+            <a:picLocks noChangeAspect="1"/>
+          </p:cNvPicPr>
+          <p:nvPr/>
+        </p:nvPicPr>
+        <p:blipFill>
+          <a:blip r:embed="rId4">
+            <a:extLst>
+              <a:ext uri="{28A0092B-C50C-407E-A947-70E740481C1C}">
+                <a14:useLocalDpi xmlns:a14="http://schemas.microsoft.com/office/drawing/2010/main"/>
+              </a:ext>
+            </a:extLst>
+          </a:blip>
+          <a:stretch>
+            <a:fillRect/>
+          </a:stretch>
+        </p:blipFill>
+        <p:spPr>
+          <a:xfrm>
+            <a:off x="1554321" y="2176651"/>
+            <a:ext cx="2174528" cy="2178152"/>
+          </a:xfrm>
+          <a:prstGeom prst="rect">
+            <a:avLst/>
+          </a:prstGeom>
+        </p:spPr>
+      </p:pic>
+      <p:cxnSp>
+        <p:nvCxnSpPr>
+          <p:cNvPr id="13" name="Connettore 2 12"/>
+          <p:cNvCxnSpPr/>
+          <p:nvPr/>
+        </p:nvCxnSpPr>
+        <p:spPr>
+          <a:xfrm>
+            <a:off x="4625149" y="2949788"/>
+            <a:ext cx="2832462" cy="1886"/>
+          </a:xfrm>
+          <a:prstGeom prst="straightConnector1">
+            <a:avLst/>
+          </a:prstGeom>
+          <a:ln w="57150">
+            <a:headEnd type="triangle"/>
+            <a:tailEnd type="triangle"/>
+          </a:ln>
+        </p:spPr>
+        <p:style>
+          <a:lnRef idx="1">
+            <a:schemeClr val="accent1"/>
+          </a:lnRef>
+          <a:fillRef idx="0">
+            <a:schemeClr val="accent1"/>
+          </a:fillRef>
+          <a:effectRef idx="0">
+            <a:schemeClr val="accent1"/>
+          </a:effectRef>
+          <a:fontRef idx="minor">
+            <a:schemeClr val="tx1"/>
+          </a:fontRef>
+        </p:style>
+      </p:cxnSp>
+      <p:pic>
+        <p:nvPicPr>
+          <p:cNvPr id="14" name="Immagine 13"/>
+          <p:cNvPicPr>
+            <a:picLocks noChangeAspect="1"/>
+          </p:cNvPicPr>
+          <p:nvPr/>
+        </p:nvPicPr>
+        <p:blipFill>
+          <a:blip r:embed="rId5">
+            <a:extLst>
+              <a:ext uri="{28A0092B-C50C-407E-A947-70E740481C1C}">
+                <a14:useLocalDpi xmlns:a14="http://schemas.microsoft.com/office/drawing/2010/main" val="0"/>
+              </a:ext>
+            </a:extLst>
+          </a:blip>
+          <a:stretch>
+            <a:fillRect/>
+          </a:stretch>
+        </p:blipFill>
+        <p:spPr>
+          <a:xfrm>
+            <a:off x="5159188" y="3554861"/>
+            <a:ext cx="1771346" cy="1771346"/>
+          </a:xfrm>
+          <a:prstGeom prst="rect">
+            <a:avLst/>
+          </a:prstGeom>
+        </p:spPr>
+      </p:pic>
+      <p:pic>
+        <p:nvPicPr>
+          <p:cNvPr id="17" name="Immagine 16"/>
+          <p:cNvPicPr>
+            <a:picLocks noChangeAspect="1"/>
+          </p:cNvPicPr>
+          <p:nvPr/>
+        </p:nvPicPr>
+        <p:blipFill>
+          <a:blip r:embed="rId6">
+            <a:extLst>
+              <a:ext uri="{28A0092B-C50C-407E-A947-70E740481C1C}">
+                <a14:useLocalDpi xmlns:a14="http://schemas.microsoft.com/office/drawing/2010/main"/>
+              </a:ext>
+            </a:extLst>
+          </a:blip>
+          <a:stretch>
+            <a:fillRect/>
+          </a:stretch>
+        </p:blipFill>
+        <p:spPr>
+          <a:xfrm>
+            <a:off x="8253145" y="2002567"/>
+            <a:ext cx="2397825" cy="2397825"/>
+          </a:xfrm>
+          <a:prstGeom prst="rect">
+            <a:avLst/>
+          </a:prstGeom>
+        </p:spPr>
+      </p:pic>
+      <p:pic>
+        <p:nvPicPr>
+          <p:cNvPr id="3" name="Immagine 2"/>
+          <p:cNvPicPr>
+            <a:picLocks noChangeAspect="1"/>
+          </p:cNvPicPr>
+          <p:nvPr/>
+        </p:nvPicPr>
+        <p:blipFill>
+          <a:blip r:embed="rId7">
+            <a:extLst>
+              <a:ext uri="{28A0092B-C50C-407E-A947-70E740481C1C}">
+                <a14:useLocalDpi xmlns:a14="http://schemas.microsoft.com/office/drawing/2010/main" val="0"/>
+              </a:ext>
+            </a:extLst>
+          </a:blip>
+          <a:stretch>
+            <a:fillRect/>
+          </a:stretch>
+        </p:blipFill>
+        <p:spPr>
+          <a:xfrm>
+            <a:off x="9820681" y="4099492"/>
+            <a:ext cx="604326" cy="251400"/>
+          </a:xfrm>
+          <a:prstGeom prst="rect">
+            <a:avLst/>
+          </a:prstGeom>
+        </p:spPr>
+      </p:pic>
     </p:spTree>
     <p:extLst>
       <p:ext uri="{BB962C8B-B14F-4D97-AF65-F5344CB8AC3E}">
-        <p14:creationId xmlns:p14="http://schemas.microsoft.com/office/powerpoint/2010/main" val="988774857"/>
+        <p14:creationId xmlns:p14="http://schemas.microsoft.com/office/powerpoint/2010/main" val="226693620"/>
+      </p:ext>
+    </p:extLst>
+  </p:cSld>
+  <p:clrMapOvr>
+    <a:masterClrMapping/>
+  </p:clrMapOvr>
+  <mc:AlternateContent xmlns:mc="http://schemas.openxmlformats.org/markup-compatibility/2006">
+    <mc:Choice xmlns:p14="http://schemas.microsoft.com/office/powerpoint/2010/main" Requires="p14">
+      <p:transition spd="med" p14:dur="700">
+        <p:fade/>
+      </p:transition>
+    </mc:Choice>
+    <mc:Fallback>
+      <p:transition spd="med">
+        <p:fade/>
+      </p:transition>
+    </mc:Fallback>
+  </mc:AlternateContent>
+  <p:timing>
+    <p:tnLst>
+      <p:par>
+        <p:cTn id="1" dur="indefinite" restart="never" nodeType="tmRoot"/>
+      </p:par>
+    </p:tnLst>
+  </p:timing>
+</p:sld>
+</file>
+
+<file path=ppt/slides/slide18.xml><?xml version="1.0" encoding="utf-8"?>
+<p:sld xmlns:a="http://schemas.openxmlformats.org/drawingml/2006/main" xmlns:r="http://schemas.openxmlformats.org/officeDocument/2006/relationships" xmlns:p="http://schemas.openxmlformats.org/presentationml/2006/main">
+  <p:cSld>
+    <p:spTree>
+      <p:nvGrpSpPr>
+        <p:cNvPr id="1" name=""/>
+        <p:cNvGrpSpPr/>
+        <p:nvPr/>
+      </p:nvGrpSpPr>
+      <p:grpSpPr>
+        <a:xfrm>
+          <a:off x="0" y="0"/>
+          <a:ext cx="0" cy="0"/>
+          <a:chOff x="0" y="0"/>
+          <a:chExt cx="0" cy="0"/>
+        </a:xfrm>
+      </p:grpSpPr>
+      <p:pic>
+        <p:nvPicPr>
+          <p:cNvPr id="2" name="Immagine 1"/>
+          <p:cNvPicPr>
+            <a:picLocks noChangeAspect="1"/>
+          </p:cNvPicPr>
+          <p:nvPr/>
+        </p:nvPicPr>
+        <p:blipFill>
+          <a:blip r:embed="rId3">
+            <a:alphaModFix amt="50000"/>
+            <a:extLst>
+              <a:ext uri="{28A0092B-C50C-407E-A947-70E740481C1C}">
+                <a14:useLocalDpi xmlns:a14="http://schemas.microsoft.com/office/drawing/2010/main" val="0"/>
+              </a:ext>
+            </a:extLst>
+          </a:blip>
+          <a:stretch>
+            <a:fillRect/>
+          </a:stretch>
+        </p:blipFill>
+        <p:spPr>
+          <a:xfrm>
+            <a:off x="-758392" y="0"/>
+            <a:ext cx="14025600" cy="7012800"/>
+          </a:xfrm>
+          <a:prstGeom prst="rect">
+            <a:avLst/>
+          </a:prstGeom>
+        </p:spPr>
+      </p:pic>
+      <p:sp>
+        <p:nvSpPr>
+          <p:cNvPr id="5" name="Segnaposto contenuto 2"/>
+          <p:cNvSpPr>
+            <a:spLocks noGrp="1"/>
+          </p:cNvSpPr>
+          <p:nvPr>
+            <p:ph idx="1"/>
+          </p:nvPr>
+        </p:nvSpPr>
+        <p:spPr>
+          <a:xfrm>
+            <a:off x="671947" y="1850167"/>
+            <a:ext cx="10131425" cy="4557560"/>
+          </a:xfrm>
+        </p:spPr>
+        <p:txBody>
+          <a:bodyPr>
+            <a:normAutofit/>
+          </a:bodyPr>
+          <a:lstStyle/>
+          <a:p>
+            <a:endParaRPr lang="en-GB" sz="4000" dirty="0" smtClean="0">
+              <a:latin typeface="+mj-lt"/>
+            </a:endParaRPr>
+          </a:p>
+          <a:p>
+            <a:endParaRPr lang="en-GB" sz="4000" dirty="0" smtClean="0">
+              <a:latin typeface="+mj-lt"/>
+            </a:endParaRPr>
+          </a:p>
+          <a:p>
+            <a:endParaRPr lang="en-GB" sz="4000" dirty="0">
+              <a:latin typeface="+mj-lt"/>
+            </a:endParaRPr>
+          </a:p>
+        </p:txBody>
+      </p:sp>
+      <p:sp>
+        <p:nvSpPr>
+          <p:cNvPr id="7" name="Titolo 1"/>
+          <p:cNvSpPr>
+            <a:spLocks noGrp="1"/>
+          </p:cNvSpPr>
+          <p:nvPr>
+            <p:ph type="title"/>
+          </p:nvPr>
+        </p:nvSpPr>
+        <p:spPr>
+          <a:xfrm>
+            <a:off x="387927" y="484909"/>
+            <a:ext cx="10131425" cy="1067385"/>
+          </a:xfrm>
+        </p:spPr>
+        <p:txBody>
+          <a:bodyPr>
+            <a:normAutofit/>
+          </a:bodyPr>
+          <a:lstStyle/>
+          <a:p>
+            <a:pPr marL="742950" marR="0" lvl="0" indent="-742950" defTabSz="914400" eaLnBrk="1" fontAlgn="auto" latinLnBrk="0" hangingPunct="1">
+              <a:lnSpc>
+                <a:spcPct val="100000"/>
+              </a:lnSpc>
+              <a:spcBef>
+                <a:spcPts val="0"/>
+              </a:spcBef>
+              <a:spcAft>
+                <a:spcPts val="0"/>
+              </a:spcAft>
+              <a:buClrTx/>
+              <a:buSzTx/>
+              <a:buFont typeface="+mj-lt"/>
+              <a:buNone/>
+              <a:tabLst/>
+              <a:defRPr/>
+            </a:pPr>
+            <a:r>
+              <a:rPr lang="en-GB" dirty="0" smtClean="0"/>
+              <a:t>3.1</a:t>
+            </a:r>
+            <a:r>
+              <a:rPr lang="en-GB" dirty="0" smtClean="0"/>
+              <a:t>	</a:t>
+            </a:r>
+            <a:r>
+              <a:rPr lang="en-GB" sz="4000" dirty="0" smtClean="0"/>
+              <a:t>Scenario Example</a:t>
+            </a:r>
+            <a:endParaRPr lang="en-GB" sz="4000" dirty="0"/>
+          </a:p>
+        </p:txBody>
+      </p:sp>
+      <p:sp>
+        <p:nvSpPr>
+          <p:cNvPr id="8" name="Segnaposto contenuto 2"/>
+          <p:cNvSpPr txBox="1">
+            <a:spLocks/>
+          </p:cNvSpPr>
+          <p:nvPr/>
+        </p:nvSpPr>
+        <p:spPr>
+          <a:xfrm>
+            <a:off x="824347" y="2002567"/>
+            <a:ext cx="10131425" cy="4557560"/>
+          </a:xfrm>
+          <a:prstGeom prst="rect">
+            <a:avLst/>
+          </a:prstGeom>
+        </p:spPr>
+        <p:txBody>
+          <a:bodyPr vert="horz" lIns="91440" tIns="45720" rIns="91440" bIns="45720" rtlCol="0" anchor="ctr">
+            <a:normAutofit/>
+          </a:bodyPr>
+          <a:lstStyle>
+            <a:lvl1pPr marL="285750" indent="-285750" algn="l" defTabSz="457200" rtl="0" eaLnBrk="1" latinLnBrk="0" hangingPunct="1">
+              <a:spcBef>
+                <a:spcPts val="0"/>
+              </a:spcBef>
+              <a:spcAft>
+                <a:spcPts val="1000"/>
+              </a:spcAft>
+              <a:buClr>
+                <a:schemeClr val="tx1"/>
+              </a:buClr>
+              <a:buSzPct val="100000"/>
+              <a:buFont typeface="Arial"/>
+              <a:buChar char="•"/>
+              <a:defRPr sz="1800" kern="1200" cap="none">
+                <a:solidFill>
+                  <a:schemeClr val="tx1"/>
+                </a:solidFill>
+                <a:effectLst/>
+                <a:latin typeface="+mn-lt"/>
+                <a:ea typeface="+mn-ea"/>
+                <a:cs typeface="+mn-cs"/>
+              </a:defRPr>
+            </a:lvl1pPr>
+            <a:lvl2pPr marL="742950" indent="-285750" algn="l" defTabSz="457200" rtl="0" eaLnBrk="1" latinLnBrk="0" hangingPunct="1">
+              <a:spcBef>
+                <a:spcPts val="0"/>
+              </a:spcBef>
+              <a:spcAft>
+                <a:spcPts val="1000"/>
+              </a:spcAft>
+              <a:buClr>
+                <a:schemeClr val="tx1"/>
+              </a:buClr>
+              <a:buSzPct val="100000"/>
+              <a:buFont typeface="Arial"/>
+              <a:buChar char="•"/>
+              <a:defRPr sz="1600" kern="1200" cap="none">
+                <a:solidFill>
+                  <a:schemeClr val="tx1"/>
+                </a:solidFill>
+                <a:effectLst/>
+                <a:latin typeface="+mn-lt"/>
+                <a:ea typeface="+mn-ea"/>
+                <a:cs typeface="+mn-cs"/>
+              </a:defRPr>
+            </a:lvl2pPr>
+            <a:lvl3pPr marL="1200150" indent="-285750" algn="l" defTabSz="457200" rtl="0" eaLnBrk="1" latinLnBrk="0" hangingPunct="1">
+              <a:spcBef>
+                <a:spcPts val="0"/>
+              </a:spcBef>
+              <a:spcAft>
+                <a:spcPts val="1000"/>
+              </a:spcAft>
+              <a:buClr>
+                <a:schemeClr val="tx1"/>
+              </a:buClr>
+              <a:buSzPct val="100000"/>
+              <a:buFont typeface="Arial"/>
+              <a:buChar char="•"/>
+              <a:defRPr sz="1400" kern="1200" cap="none">
+                <a:solidFill>
+                  <a:schemeClr val="tx1"/>
+                </a:solidFill>
+                <a:effectLst/>
+                <a:latin typeface="+mn-lt"/>
+                <a:ea typeface="+mn-ea"/>
+                <a:cs typeface="+mn-cs"/>
+              </a:defRPr>
+            </a:lvl3pPr>
+            <a:lvl4pPr marL="1543050" indent="-171450" algn="l" defTabSz="457200" rtl="0" eaLnBrk="1" latinLnBrk="0" hangingPunct="1">
+              <a:spcBef>
+                <a:spcPts val="0"/>
+              </a:spcBef>
+              <a:spcAft>
+                <a:spcPts val="1000"/>
+              </a:spcAft>
+              <a:buClr>
+                <a:schemeClr val="tx1"/>
+              </a:buClr>
+              <a:buSzPct val="100000"/>
+              <a:buFont typeface="Arial"/>
+              <a:buChar char="•"/>
+              <a:defRPr sz="1200" kern="1200" cap="none">
+                <a:solidFill>
+                  <a:schemeClr val="tx1"/>
+                </a:solidFill>
+                <a:effectLst/>
+                <a:latin typeface="+mn-lt"/>
+                <a:ea typeface="+mn-ea"/>
+                <a:cs typeface="+mn-cs"/>
+              </a:defRPr>
+            </a:lvl4pPr>
+            <a:lvl5pPr marL="2000250" indent="-171450" algn="l" defTabSz="457200" rtl="0" eaLnBrk="1" latinLnBrk="0" hangingPunct="1">
+              <a:spcBef>
+                <a:spcPts val="0"/>
+              </a:spcBef>
+              <a:spcAft>
+                <a:spcPts val="1000"/>
+              </a:spcAft>
+              <a:buClr>
+                <a:schemeClr val="tx1"/>
+              </a:buClr>
+              <a:buSzPct val="100000"/>
+              <a:buFont typeface="Arial"/>
+              <a:buChar char="•"/>
+              <a:defRPr sz="1200" kern="1200" cap="none">
+                <a:solidFill>
+                  <a:schemeClr val="tx1"/>
+                </a:solidFill>
+                <a:effectLst/>
+                <a:latin typeface="+mn-lt"/>
+                <a:ea typeface="+mn-ea"/>
+                <a:cs typeface="+mn-cs"/>
+              </a:defRPr>
+            </a:lvl5pPr>
+            <a:lvl6pPr marL="2514600" indent="-228600" algn="l" defTabSz="457200" rtl="0" eaLnBrk="1" latinLnBrk="0" hangingPunct="1">
+              <a:spcBef>
+                <a:spcPts val="0"/>
+              </a:spcBef>
+              <a:spcAft>
+                <a:spcPts val="1000"/>
+              </a:spcAft>
+              <a:buClr>
+                <a:schemeClr val="tx1"/>
+              </a:buClr>
+              <a:buSzPct val="100000"/>
+              <a:buFont typeface="Arial"/>
+              <a:buChar char="•"/>
+              <a:defRPr sz="1200" kern="1200" cap="none">
+                <a:solidFill>
+                  <a:schemeClr val="tx1"/>
+                </a:solidFill>
+                <a:effectLst/>
+                <a:latin typeface="+mn-lt"/>
+                <a:ea typeface="+mn-ea"/>
+                <a:cs typeface="+mn-cs"/>
+              </a:defRPr>
+            </a:lvl6pPr>
+            <a:lvl7pPr marL="2971800" indent="-228600" algn="l" defTabSz="457200" rtl="0" eaLnBrk="1" latinLnBrk="0" hangingPunct="1">
+              <a:spcBef>
+                <a:spcPts val="0"/>
+              </a:spcBef>
+              <a:spcAft>
+                <a:spcPts val="1000"/>
+              </a:spcAft>
+              <a:buClr>
+                <a:schemeClr val="tx1"/>
+              </a:buClr>
+              <a:buSzPct val="100000"/>
+              <a:buFont typeface="Arial"/>
+              <a:buChar char="•"/>
+              <a:defRPr sz="1200" kern="1200" cap="none">
+                <a:solidFill>
+                  <a:schemeClr val="tx1"/>
+                </a:solidFill>
+                <a:effectLst/>
+                <a:latin typeface="+mn-lt"/>
+                <a:ea typeface="+mn-ea"/>
+                <a:cs typeface="+mn-cs"/>
+              </a:defRPr>
+            </a:lvl7pPr>
+            <a:lvl8pPr marL="3429000" indent="-228600" algn="l" defTabSz="457200" rtl="0" eaLnBrk="1" latinLnBrk="0" hangingPunct="1">
+              <a:spcBef>
+                <a:spcPts val="0"/>
+              </a:spcBef>
+              <a:spcAft>
+                <a:spcPts val="1000"/>
+              </a:spcAft>
+              <a:buClr>
+                <a:schemeClr val="tx1"/>
+              </a:buClr>
+              <a:buSzPct val="100000"/>
+              <a:buFont typeface="Arial"/>
+              <a:buChar char="•"/>
+              <a:defRPr sz="1200" kern="1200" cap="none">
+                <a:solidFill>
+                  <a:schemeClr val="tx1"/>
+                </a:solidFill>
+                <a:effectLst/>
+                <a:latin typeface="+mn-lt"/>
+                <a:ea typeface="+mn-ea"/>
+                <a:cs typeface="+mn-cs"/>
+              </a:defRPr>
+            </a:lvl8pPr>
+            <a:lvl9pPr marL="3886200" indent="-228600" algn="l" defTabSz="457200" rtl="0" eaLnBrk="1" latinLnBrk="0" hangingPunct="1">
+              <a:spcBef>
+                <a:spcPts val="0"/>
+              </a:spcBef>
+              <a:spcAft>
+                <a:spcPts val="1000"/>
+              </a:spcAft>
+              <a:buClr>
+                <a:schemeClr val="tx1"/>
+              </a:buClr>
+              <a:buSzPct val="100000"/>
+              <a:buFont typeface="Arial"/>
+              <a:buChar char="•"/>
+              <a:defRPr sz="1200" kern="1200" cap="none">
+                <a:solidFill>
+                  <a:schemeClr val="tx1"/>
+                </a:solidFill>
+                <a:effectLst/>
+                <a:latin typeface="+mn-lt"/>
+                <a:ea typeface="+mn-ea"/>
+                <a:cs typeface="+mn-cs"/>
+              </a:defRPr>
+            </a:lvl9pPr>
+          </a:lstStyle>
+          <a:p>
+            <a:endParaRPr lang="en-GB" sz="4000" dirty="0" smtClean="0">
+              <a:latin typeface="+mj-lt"/>
+            </a:endParaRPr>
+          </a:p>
+          <a:p>
+            <a:endParaRPr lang="en-GB" sz="4000" dirty="0" smtClean="0">
+              <a:latin typeface="+mj-lt"/>
+            </a:endParaRPr>
+          </a:p>
+          <a:p>
+            <a:endParaRPr lang="en-GB" sz="4000" dirty="0">
+              <a:latin typeface="+mj-lt"/>
+            </a:endParaRPr>
+          </a:p>
+        </p:txBody>
+      </p:sp>
+      <p:pic>
+        <p:nvPicPr>
+          <p:cNvPr id="14" name="Immagine 13"/>
+          <p:cNvPicPr>
+            <a:picLocks noChangeAspect="1"/>
+          </p:cNvPicPr>
+          <p:nvPr/>
+        </p:nvPicPr>
+        <p:blipFill>
+          <a:blip r:embed="rId4">
+            <a:extLst>
+              <a:ext uri="{28A0092B-C50C-407E-A947-70E740481C1C}">
+                <a14:useLocalDpi xmlns:a14="http://schemas.microsoft.com/office/drawing/2010/main" val="0"/>
+              </a:ext>
+            </a:extLst>
+          </a:blip>
+          <a:stretch>
+            <a:fillRect/>
+          </a:stretch>
+        </p:blipFill>
+        <p:spPr>
+          <a:xfrm>
+            <a:off x="3735228" y="1369368"/>
+            <a:ext cx="5038359" cy="5038359"/>
+          </a:xfrm>
+          <a:prstGeom prst="rect">
+            <a:avLst/>
+          </a:prstGeom>
+        </p:spPr>
+      </p:pic>
+    </p:spTree>
+    <p:extLst>
+      <p:ext uri="{BB962C8B-B14F-4D97-AF65-F5344CB8AC3E}">
+        <p14:creationId xmlns:p14="http://schemas.microsoft.com/office/powerpoint/2010/main" val="365816636"/>
+      </p:ext>
+    </p:extLst>
+  </p:cSld>
+  <p:clrMapOvr>
+    <a:masterClrMapping/>
+  </p:clrMapOvr>
+  <mc:AlternateContent xmlns:mc="http://schemas.openxmlformats.org/markup-compatibility/2006">
+    <mc:Choice xmlns:p14="http://schemas.microsoft.com/office/powerpoint/2010/main" Requires="p14">
+      <p:transition spd="med" p14:dur="700">
+        <p:fade/>
+      </p:transition>
+    </mc:Choice>
+    <mc:Fallback>
+      <p:transition spd="med">
+        <p:fade/>
+      </p:transition>
+    </mc:Fallback>
+  </mc:AlternateContent>
+  <p:timing>
+    <p:tnLst>
+      <p:par>
+        <p:cTn id="1" dur="indefinite" restart="never" nodeType="tmRoot"/>
+      </p:par>
+    </p:tnLst>
+  </p:timing>
+</p:sld>
+</file>
+
+<file path=ppt/slides/slide19.xml><?xml version="1.0" encoding="utf-8"?>
+<p:sld xmlns:a="http://schemas.openxmlformats.org/drawingml/2006/main" xmlns:r="http://schemas.openxmlformats.org/officeDocument/2006/relationships" xmlns:p="http://schemas.openxmlformats.org/presentationml/2006/main">
+  <p:cSld>
+    <p:spTree>
+      <p:nvGrpSpPr>
+        <p:cNvPr id="1" name=""/>
+        <p:cNvGrpSpPr/>
+        <p:nvPr/>
+      </p:nvGrpSpPr>
+      <p:grpSpPr>
+        <a:xfrm>
+          <a:off x="0" y="0"/>
+          <a:ext cx="0" cy="0"/>
+          <a:chOff x="0" y="0"/>
+          <a:chExt cx="0" cy="0"/>
+        </a:xfrm>
+      </p:grpSpPr>
+      <p:pic>
+        <p:nvPicPr>
+          <p:cNvPr id="23" name="Immagine 22"/>
+          <p:cNvPicPr>
+            <a:picLocks noChangeAspect="1"/>
+          </p:cNvPicPr>
+          <p:nvPr/>
+        </p:nvPicPr>
+        <p:blipFill>
+          <a:blip r:embed="rId3">
+            <a:alphaModFix amt="50000"/>
+            <a:extLst>
+              <a:ext uri="{28A0092B-C50C-407E-A947-70E740481C1C}">
+                <a14:useLocalDpi xmlns:a14="http://schemas.microsoft.com/office/drawing/2010/main" val="0"/>
+              </a:ext>
+            </a:extLst>
+          </a:blip>
+          <a:stretch>
+            <a:fillRect/>
+          </a:stretch>
+        </p:blipFill>
+        <p:spPr>
+          <a:xfrm>
+            <a:off x="-798149" y="0"/>
+            <a:ext cx="14025600" cy="7012800"/>
+          </a:xfrm>
+          <a:prstGeom prst="rect">
+            <a:avLst/>
+          </a:prstGeom>
+        </p:spPr>
+      </p:pic>
+      <p:sp>
+        <p:nvSpPr>
+          <p:cNvPr id="5" name="Segnaposto contenuto 2"/>
+          <p:cNvSpPr>
+            <a:spLocks noGrp="1"/>
+          </p:cNvSpPr>
+          <p:nvPr>
+            <p:ph idx="1"/>
+          </p:nvPr>
+        </p:nvSpPr>
+        <p:spPr>
+          <a:xfrm>
+            <a:off x="671947" y="1850167"/>
+            <a:ext cx="10131425" cy="4557560"/>
+          </a:xfrm>
+        </p:spPr>
+        <p:txBody>
+          <a:bodyPr>
+            <a:normAutofit/>
+          </a:bodyPr>
+          <a:lstStyle/>
+          <a:p>
+            <a:endParaRPr lang="en-GB" sz="4000" dirty="0" smtClean="0">
+              <a:latin typeface="+mj-lt"/>
+            </a:endParaRPr>
+          </a:p>
+          <a:p>
+            <a:endParaRPr lang="en-GB" sz="4000" dirty="0" smtClean="0">
+              <a:latin typeface="+mj-lt"/>
+            </a:endParaRPr>
+          </a:p>
+          <a:p>
+            <a:endParaRPr lang="en-GB" sz="4000" dirty="0">
+              <a:latin typeface="+mj-lt"/>
+            </a:endParaRPr>
+          </a:p>
+        </p:txBody>
+      </p:sp>
+      <p:sp>
+        <p:nvSpPr>
+          <p:cNvPr id="7" name="Titolo 1"/>
+          <p:cNvSpPr>
+            <a:spLocks noGrp="1"/>
+          </p:cNvSpPr>
+          <p:nvPr>
+            <p:ph type="title"/>
+          </p:nvPr>
+        </p:nvSpPr>
+        <p:spPr>
+          <a:xfrm>
+            <a:off x="387927" y="484909"/>
+            <a:ext cx="10131425" cy="1067385"/>
+          </a:xfrm>
+        </p:spPr>
+        <p:txBody>
+          <a:bodyPr>
+            <a:normAutofit/>
+          </a:bodyPr>
+          <a:lstStyle/>
+          <a:p>
+            <a:pPr marL="742950" marR="0" lvl="0" indent="-742950" defTabSz="914400" eaLnBrk="1" fontAlgn="auto" latinLnBrk="0" hangingPunct="1">
+              <a:lnSpc>
+                <a:spcPct val="100000"/>
+              </a:lnSpc>
+              <a:spcBef>
+                <a:spcPts val="0"/>
+              </a:spcBef>
+              <a:spcAft>
+                <a:spcPts val="0"/>
+              </a:spcAft>
+              <a:buClrTx/>
+              <a:buSzTx/>
+              <a:buFont typeface="+mj-lt"/>
+              <a:buNone/>
+              <a:tabLst/>
+              <a:defRPr/>
+            </a:pPr>
+            <a:r>
+              <a:rPr lang="en-GB" dirty="0" smtClean="0"/>
+              <a:t>3.1</a:t>
+            </a:r>
+            <a:r>
+              <a:rPr lang="en-GB" dirty="0" smtClean="0"/>
+              <a:t>	</a:t>
+            </a:r>
+            <a:r>
+              <a:rPr lang="en-GB" sz="4000" dirty="0" smtClean="0"/>
+              <a:t>Scenario Example</a:t>
+            </a:r>
+            <a:endParaRPr lang="en-GB" sz="4000" dirty="0"/>
+          </a:p>
+        </p:txBody>
+      </p:sp>
+      <p:sp>
+        <p:nvSpPr>
+          <p:cNvPr id="8" name="Segnaposto contenuto 2"/>
+          <p:cNvSpPr txBox="1">
+            <a:spLocks/>
+          </p:cNvSpPr>
+          <p:nvPr/>
+        </p:nvSpPr>
+        <p:spPr>
+          <a:xfrm>
+            <a:off x="824347" y="2002567"/>
+            <a:ext cx="10131425" cy="4557560"/>
+          </a:xfrm>
+          <a:prstGeom prst="rect">
+            <a:avLst/>
+          </a:prstGeom>
+        </p:spPr>
+        <p:txBody>
+          <a:bodyPr vert="horz" lIns="91440" tIns="45720" rIns="91440" bIns="45720" rtlCol="0" anchor="ctr">
+            <a:normAutofit/>
+          </a:bodyPr>
+          <a:lstStyle>
+            <a:lvl1pPr marL="285750" indent="-285750" algn="l" defTabSz="457200" rtl="0" eaLnBrk="1" latinLnBrk="0" hangingPunct="1">
+              <a:spcBef>
+                <a:spcPts val="0"/>
+              </a:spcBef>
+              <a:spcAft>
+                <a:spcPts val="1000"/>
+              </a:spcAft>
+              <a:buClr>
+                <a:schemeClr val="tx1"/>
+              </a:buClr>
+              <a:buSzPct val="100000"/>
+              <a:buFont typeface="Arial"/>
+              <a:buChar char="•"/>
+              <a:defRPr sz="1800" kern="1200" cap="none">
+                <a:solidFill>
+                  <a:schemeClr val="tx1"/>
+                </a:solidFill>
+                <a:effectLst/>
+                <a:latin typeface="+mn-lt"/>
+                <a:ea typeface="+mn-ea"/>
+                <a:cs typeface="+mn-cs"/>
+              </a:defRPr>
+            </a:lvl1pPr>
+            <a:lvl2pPr marL="742950" indent="-285750" algn="l" defTabSz="457200" rtl="0" eaLnBrk="1" latinLnBrk="0" hangingPunct="1">
+              <a:spcBef>
+                <a:spcPts val="0"/>
+              </a:spcBef>
+              <a:spcAft>
+                <a:spcPts val="1000"/>
+              </a:spcAft>
+              <a:buClr>
+                <a:schemeClr val="tx1"/>
+              </a:buClr>
+              <a:buSzPct val="100000"/>
+              <a:buFont typeface="Arial"/>
+              <a:buChar char="•"/>
+              <a:defRPr sz="1600" kern="1200" cap="none">
+                <a:solidFill>
+                  <a:schemeClr val="tx1"/>
+                </a:solidFill>
+                <a:effectLst/>
+                <a:latin typeface="+mn-lt"/>
+                <a:ea typeface="+mn-ea"/>
+                <a:cs typeface="+mn-cs"/>
+              </a:defRPr>
+            </a:lvl2pPr>
+            <a:lvl3pPr marL="1200150" indent="-285750" algn="l" defTabSz="457200" rtl="0" eaLnBrk="1" latinLnBrk="0" hangingPunct="1">
+              <a:spcBef>
+                <a:spcPts val="0"/>
+              </a:spcBef>
+              <a:spcAft>
+                <a:spcPts val="1000"/>
+              </a:spcAft>
+              <a:buClr>
+                <a:schemeClr val="tx1"/>
+              </a:buClr>
+              <a:buSzPct val="100000"/>
+              <a:buFont typeface="Arial"/>
+              <a:buChar char="•"/>
+              <a:defRPr sz="1400" kern="1200" cap="none">
+                <a:solidFill>
+                  <a:schemeClr val="tx1"/>
+                </a:solidFill>
+                <a:effectLst/>
+                <a:latin typeface="+mn-lt"/>
+                <a:ea typeface="+mn-ea"/>
+                <a:cs typeface="+mn-cs"/>
+              </a:defRPr>
+            </a:lvl3pPr>
+            <a:lvl4pPr marL="1543050" indent="-171450" algn="l" defTabSz="457200" rtl="0" eaLnBrk="1" latinLnBrk="0" hangingPunct="1">
+              <a:spcBef>
+                <a:spcPts val="0"/>
+              </a:spcBef>
+              <a:spcAft>
+                <a:spcPts val="1000"/>
+              </a:spcAft>
+              <a:buClr>
+                <a:schemeClr val="tx1"/>
+              </a:buClr>
+              <a:buSzPct val="100000"/>
+              <a:buFont typeface="Arial"/>
+              <a:buChar char="•"/>
+              <a:defRPr sz="1200" kern="1200" cap="none">
+                <a:solidFill>
+                  <a:schemeClr val="tx1"/>
+                </a:solidFill>
+                <a:effectLst/>
+                <a:latin typeface="+mn-lt"/>
+                <a:ea typeface="+mn-ea"/>
+                <a:cs typeface="+mn-cs"/>
+              </a:defRPr>
+            </a:lvl4pPr>
+            <a:lvl5pPr marL="2000250" indent="-171450" algn="l" defTabSz="457200" rtl="0" eaLnBrk="1" latinLnBrk="0" hangingPunct="1">
+              <a:spcBef>
+                <a:spcPts val="0"/>
+              </a:spcBef>
+              <a:spcAft>
+                <a:spcPts val="1000"/>
+              </a:spcAft>
+              <a:buClr>
+                <a:schemeClr val="tx1"/>
+              </a:buClr>
+              <a:buSzPct val="100000"/>
+              <a:buFont typeface="Arial"/>
+              <a:buChar char="•"/>
+              <a:defRPr sz="1200" kern="1200" cap="none">
+                <a:solidFill>
+                  <a:schemeClr val="tx1"/>
+                </a:solidFill>
+                <a:effectLst/>
+                <a:latin typeface="+mn-lt"/>
+                <a:ea typeface="+mn-ea"/>
+                <a:cs typeface="+mn-cs"/>
+              </a:defRPr>
+            </a:lvl5pPr>
+            <a:lvl6pPr marL="2514600" indent="-228600" algn="l" defTabSz="457200" rtl="0" eaLnBrk="1" latinLnBrk="0" hangingPunct="1">
+              <a:spcBef>
+                <a:spcPts val="0"/>
+              </a:spcBef>
+              <a:spcAft>
+                <a:spcPts val="1000"/>
+              </a:spcAft>
+              <a:buClr>
+                <a:schemeClr val="tx1"/>
+              </a:buClr>
+              <a:buSzPct val="100000"/>
+              <a:buFont typeface="Arial"/>
+              <a:buChar char="•"/>
+              <a:defRPr sz="1200" kern="1200" cap="none">
+                <a:solidFill>
+                  <a:schemeClr val="tx1"/>
+                </a:solidFill>
+                <a:effectLst/>
+                <a:latin typeface="+mn-lt"/>
+                <a:ea typeface="+mn-ea"/>
+                <a:cs typeface="+mn-cs"/>
+              </a:defRPr>
+            </a:lvl6pPr>
+            <a:lvl7pPr marL="2971800" indent="-228600" algn="l" defTabSz="457200" rtl="0" eaLnBrk="1" latinLnBrk="0" hangingPunct="1">
+              <a:spcBef>
+                <a:spcPts val="0"/>
+              </a:spcBef>
+              <a:spcAft>
+                <a:spcPts val="1000"/>
+              </a:spcAft>
+              <a:buClr>
+                <a:schemeClr val="tx1"/>
+              </a:buClr>
+              <a:buSzPct val="100000"/>
+              <a:buFont typeface="Arial"/>
+              <a:buChar char="•"/>
+              <a:defRPr sz="1200" kern="1200" cap="none">
+                <a:solidFill>
+                  <a:schemeClr val="tx1"/>
+                </a:solidFill>
+                <a:effectLst/>
+                <a:latin typeface="+mn-lt"/>
+                <a:ea typeface="+mn-ea"/>
+                <a:cs typeface="+mn-cs"/>
+              </a:defRPr>
+            </a:lvl7pPr>
+            <a:lvl8pPr marL="3429000" indent="-228600" algn="l" defTabSz="457200" rtl="0" eaLnBrk="1" latinLnBrk="0" hangingPunct="1">
+              <a:spcBef>
+                <a:spcPts val="0"/>
+              </a:spcBef>
+              <a:spcAft>
+                <a:spcPts val="1000"/>
+              </a:spcAft>
+              <a:buClr>
+                <a:schemeClr val="tx1"/>
+              </a:buClr>
+              <a:buSzPct val="100000"/>
+              <a:buFont typeface="Arial"/>
+              <a:buChar char="•"/>
+              <a:defRPr sz="1200" kern="1200" cap="none">
+                <a:solidFill>
+                  <a:schemeClr val="tx1"/>
+                </a:solidFill>
+                <a:effectLst/>
+                <a:latin typeface="+mn-lt"/>
+                <a:ea typeface="+mn-ea"/>
+                <a:cs typeface="+mn-cs"/>
+              </a:defRPr>
+            </a:lvl8pPr>
+            <a:lvl9pPr marL="3886200" indent="-228600" algn="l" defTabSz="457200" rtl="0" eaLnBrk="1" latinLnBrk="0" hangingPunct="1">
+              <a:spcBef>
+                <a:spcPts val="0"/>
+              </a:spcBef>
+              <a:spcAft>
+                <a:spcPts val="1000"/>
+              </a:spcAft>
+              <a:buClr>
+                <a:schemeClr val="tx1"/>
+              </a:buClr>
+              <a:buSzPct val="100000"/>
+              <a:buFont typeface="Arial"/>
+              <a:buChar char="•"/>
+              <a:defRPr sz="1200" kern="1200" cap="none">
+                <a:solidFill>
+                  <a:schemeClr val="tx1"/>
+                </a:solidFill>
+                <a:effectLst/>
+                <a:latin typeface="+mn-lt"/>
+                <a:ea typeface="+mn-ea"/>
+                <a:cs typeface="+mn-cs"/>
+              </a:defRPr>
+            </a:lvl9pPr>
+          </a:lstStyle>
+          <a:p>
+            <a:endParaRPr lang="en-GB" sz="4000" dirty="0" smtClean="0">
+              <a:latin typeface="+mj-lt"/>
+            </a:endParaRPr>
+          </a:p>
+          <a:p>
+            <a:endParaRPr lang="en-GB" sz="4000" dirty="0" smtClean="0">
+              <a:latin typeface="+mj-lt"/>
+            </a:endParaRPr>
+          </a:p>
+          <a:p>
+            <a:endParaRPr lang="en-GB" sz="4000" dirty="0">
+              <a:latin typeface="+mj-lt"/>
+            </a:endParaRPr>
+          </a:p>
+        </p:txBody>
+      </p:sp>
+      <p:cxnSp>
+        <p:nvCxnSpPr>
+          <p:cNvPr id="15" name="Connettore 2 14"/>
+          <p:cNvCxnSpPr/>
+          <p:nvPr/>
+        </p:nvCxnSpPr>
+        <p:spPr>
+          <a:xfrm>
+            <a:off x="4352499" y="2466490"/>
+            <a:ext cx="3272495" cy="8299"/>
+          </a:xfrm>
+          <a:prstGeom prst="straightConnector1">
+            <a:avLst/>
+          </a:prstGeom>
+          <a:ln w="57150">
+            <a:tailEnd type="triangle"/>
+          </a:ln>
+        </p:spPr>
+        <p:style>
+          <a:lnRef idx="1">
+            <a:schemeClr val="accent1"/>
+          </a:lnRef>
+          <a:fillRef idx="0">
+            <a:schemeClr val="accent1"/>
+          </a:fillRef>
+          <a:effectRef idx="0">
+            <a:schemeClr val="accent1"/>
+          </a:effectRef>
+          <a:fontRef idx="minor">
+            <a:schemeClr val="tx1"/>
+          </a:fontRef>
+        </p:style>
+      </p:cxnSp>
+      <p:pic>
+        <p:nvPicPr>
+          <p:cNvPr id="16" name="Immagine 15"/>
+          <p:cNvPicPr>
+            <a:picLocks noChangeAspect="1"/>
+          </p:cNvPicPr>
+          <p:nvPr/>
+        </p:nvPicPr>
+        <p:blipFill>
+          <a:blip r:embed="rId4">
+            <a:extLst>
+              <a:ext uri="{28A0092B-C50C-407E-A947-70E740481C1C}">
+                <a14:useLocalDpi xmlns:a14="http://schemas.microsoft.com/office/drawing/2010/main"/>
+              </a:ext>
+            </a:extLst>
+          </a:blip>
+          <a:stretch>
+            <a:fillRect/>
+          </a:stretch>
+        </p:blipFill>
+        <p:spPr>
+          <a:xfrm>
+            <a:off x="1743827" y="2200048"/>
+            <a:ext cx="2174528" cy="2178152"/>
+          </a:xfrm>
+          <a:prstGeom prst="rect">
+            <a:avLst/>
+          </a:prstGeom>
+        </p:spPr>
+      </p:pic>
+      <p:pic>
+        <p:nvPicPr>
+          <p:cNvPr id="20" name="Immagine 19"/>
+          <p:cNvPicPr>
+            <a:picLocks noChangeAspect="1"/>
+          </p:cNvPicPr>
+          <p:nvPr/>
+        </p:nvPicPr>
+        <p:blipFill>
+          <a:blip r:embed="rId5">
+            <a:extLst>
+              <a:ext uri="{28A0092B-C50C-407E-A947-70E740481C1C}">
+                <a14:useLocalDpi xmlns:a14="http://schemas.microsoft.com/office/drawing/2010/main" val="0"/>
+              </a:ext>
+            </a:extLst>
+          </a:blip>
+          <a:stretch>
+            <a:fillRect/>
+          </a:stretch>
+        </p:blipFill>
+        <p:spPr>
+          <a:xfrm>
+            <a:off x="5708792" y="4457162"/>
+            <a:ext cx="1688132" cy="1575590"/>
+          </a:xfrm>
+          <a:prstGeom prst="rect">
+            <a:avLst/>
+          </a:prstGeom>
+        </p:spPr>
+      </p:pic>
+      <p:cxnSp>
+        <p:nvCxnSpPr>
+          <p:cNvPr id="21" name="Connettore 2 20"/>
+          <p:cNvCxnSpPr/>
+          <p:nvPr/>
+        </p:nvCxnSpPr>
+        <p:spPr>
+          <a:xfrm flipH="1" flipV="1">
+            <a:off x="4544832" y="3826868"/>
+            <a:ext cx="4118283" cy="1146127"/>
+          </a:xfrm>
+          <a:prstGeom prst="straightConnector1">
+            <a:avLst/>
+          </a:prstGeom>
+          <a:ln w="57150">
+            <a:tailEnd type="triangle"/>
+          </a:ln>
+        </p:spPr>
+        <p:style>
+          <a:lnRef idx="1">
+            <a:schemeClr val="accent1"/>
+          </a:lnRef>
+          <a:fillRef idx="0">
+            <a:schemeClr val="accent1"/>
+          </a:fillRef>
+          <a:effectRef idx="0">
+            <a:schemeClr val="accent1"/>
+          </a:effectRef>
+          <a:fontRef idx="minor">
+            <a:schemeClr val="tx1"/>
+          </a:fontRef>
+        </p:style>
+      </p:cxnSp>
+      <p:pic>
+        <p:nvPicPr>
+          <p:cNvPr id="24" name="Immagine 23"/>
+          <p:cNvPicPr>
+            <a:picLocks noChangeAspect="1"/>
+          </p:cNvPicPr>
+          <p:nvPr/>
+        </p:nvPicPr>
+        <p:blipFill>
+          <a:blip r:embed="rId6">
+            <a:extLst>
+              <a:ext uri="{28A0092B-C50C-407E-A947-70E740481C1C}">
+                <a14:useLocalDpi xmlns:a14="http://schemas.microsoft.com/office/drawing/2010/main"/>
+              </a:ext>
+            </a:extLst>
+          </a:blip>
+          <a:stretch>
+            <a:fillRect/>
+          </a:stretch>
+        </p:blipFill>
+        <p:spPr>
+          <a:xfrm>
+            <a:off x="8663115" y="193127"/>
+            <a:ext cx="2397825" cy="2397825"/>
+          </a:xfrm>
+          <a:prstGeom prst="rect">
+            <a:avLst/>
+          </a:prstGeom>
+        </p:spPr>
+      </p:pic>
+      <p:pic>
+        <p:nvPicPr>
+          <p:cNvPr id="22" name="Immagine 21"/>
+          <p:cNvPicPr>
+            <a:picLocks noChangeAspect="1"/>
+          </p:cNvPicPr>
+          <p:nvPr/>
+        </p:nvPicPr>
+        <p:blipFill>
+          <a:blip r:embed="rId7">
+            <a:extLst>
+              <a:ext uri="{28A0092B-C50C-407E-A947-70E740481C1C}">
+                <a14:useLocalDpi xmlns:a14="http://schemas.microsoft.com/office/drawing/2010/main"/>
+              </a:ext>
+            </a:extLst>
+          </a:blip>
+          <a:stretch>
+            <a:fillRect/>
+          </a:stretch>
+        </p:blipFill>
+        <p:spPr>
+          <a:xfrm>
+            <a:off x="5823339" y="1439713"/>
+            <a:ext cx="799053" cy="799053"/>
+          </a:xfrm>
+          <a:prstGeom prst="rect">
+            <a:avLst/>
+          </a:prstGeom>
+        </p:spPr>
+      </p:pic>
+      <p:pic>
+        <p:nvPicPr>
+          <p:cNvPr id="3" name="Immagine 2"/>
+          <p:cNvPicPr>
+            <a:picLocks noChangeAspect="1"/>
+          </p:cNvPicPr>
+          <p:nvPr/>
+        </p:nvPicPr>
+        <p:blipFill>
+          <a:blip r:embed="rId8">
+            <a:extLst>
+              <a:ext uri="{28A0092B-C50C-407E-A947-70E740481C1C}">
+                <a14:useLocalDpi xmlns:a14="http://schemas.microsoft.com/office/drawing/2010/main" val="0"/>
+              </a:ext>
+            </a:extLst>
+          </a:blip>
+          <a:stretch>
+            <a:fillRect/>
+          </a:stretch>
+        </p:blipFill>
+        <p:spPr>
+          <a:xfrm>
+            <a:off x="10125483" y="2339552"/>
+            <a:ext cx="604326" cy="251400"/>
+          </a:xfrm>
+          <a:prstGeom prst="rect">
+            <a:avLst/>
+          </a:prstGeom>
+        </p:spPr>
+      </p:pic>
+      <p:pic>
+        <p:nvPicPr>
+          <p:cNvPr id="4" name="Immagine 3"/>
+          <p:cNvPicPr>
+            <a:picLocks noChangeAspect="1"/>
+          </p:cNvPicPr>
+          <p:nvPr/>
+        </p:nvPicPr>
+        <p:blipFill>
+          <a:blip r:embed="rId9"/>
+          <a:stretch>
+            <a:fillRect/>
+          </a:stretch>
+        </p:blipFill>
+        <p:spPr>
+          <a:xfrm>
+            <a:off x="9064487" y="4591700"/>
+            <a:ext cx="1665322" cy="1665322"/>
+          </a:xfrm>
+          <a:prstGeom prst="rect">
+            <a:avLst/>
+          </a:prstGeom>
+        </p:spPr>
+      </p:pic>
+      <p:cxnSp>
+        <p:nvCxnSpPr>
+          <p:cNvPr id="25" name="Connettore 2 24"/>
+          <p:cNvCxnSpPr/>
+          <p:nvPr/>
+        </p:nvCxnSpPr>
+        <p:spPr>
+          <a:xfrm>
+            <a:off x="9283147" y="2877898"/>
+            <a:ext cx="0" cy="1500302"/>
+          </a:xfrm>
+          <a:prstGeom prst="straightConnector1">
+            <a:avLst/>
+          </a:prstGeom>
+          <a:ln w="57150">
+            <a:prstDash val="dash"/>
+            <a:tailEnd type="triangle"/>
+          </a:ln>
+        </p:spPr>
+        <p:style>
+          <a:lnRef idx="1">
+            <a:schemeClr val="accent1"/>
+          </a:lnRef>
+          <a:fillRef idx="0">
+            <a:schemeClr val="accent1"/>
+          </a:fillRef>
+          <a:effectRef idx="0">
+            <a:schemeClr val="accent1"/>
+          </a:effectRef>
+          <a:fontRef idx="minor">
+            <a:schemeClr val="tx1"/>
+          </a:fontRef>
+        </p:style>
+      </p:cxnSp>
+      <p:cxnSp>
+        <p:nvCxnSpPr>
+          <p:cNvPr id="26" name="Connettore 2 25"/>
+          <p:cNvCxnSpPr/>
+          <p:nvPr/>
+        </p:nvCxnSpPr>
+        <p:spPr>
+          <a:xfrm flipV="1">
+            <a:off x="10284152" y="2827725"/>
+            <a:ext cx="23630" cy="1466102"/>
+          </a:xfrm>
+          <a:prstGeom prst="straightConnector1">
+            <a:avLst/>
+          </a:prstGeom>
+          <a:ln w="57150">
+            <a:prstDash val="dash"/>
+            <a:tailEnd type="triangle"/>
+          </a:ln>
+        </p:spPr>
+        <p:style>
+          <a:lnRef idx="1">
+            <a:schemeClr val="accent1"/>
+          </a:lnRef>
+          <a:fillRef idx="0">
+            <a:schemeClr val="accent1"/>
+          </a:fillRef>
+          <a:effectRef idx="0">
+            <a:schemeClr val="accent1"/>
+          </a:effectRef>
+          <a:fontRef idx="minor">
+            <a:schemeClr val="tx1"/>
+          </a:fontRef>
+        </p:style>
+      </p:cxnSp>
+      <p:pic>
+        <p:nvPicPr>
+          <p:cNvPr id="29" name="Immagine 28"/>
+          <p:cNvPicPr>
+            <a:picLocks noChangeAspect="1"/>
+          </p:cNvPicPr>
+          <p:nvPr/>
+        </p:nvPicPr>
+        <p:blipFill>
+          <a:blip r:embed="rId10">
+            <a:extLst>
+              <a:ext uri="{28A0092B-C50C-407E-A947-70E740481C1C}">
+                <a14:useLocalDpi xmlns:a14="http://schemas.microsoft.com/office/drawing/2010/main"/>
+              </a:ext>
+            </a:extLst>
+          </a:blip>
+          <a:stretch>
+            <a:fillRect/>
+          </a:stretch>
+        </p:blipFill>
+        <p:spPr>
+          <a:xfrm>
+            <a:off x="7678799" y="5125395"/>
+            <a:ext cx="694298" cy="694298"/>
+          </a:xfrm>
+          <a:prstGeom prst="rect">
+            <a:avLst/>
+          </a:prstGeom>
+        </p:spPr>
+      </p:pic>
+      <p:pic>
+        <p:nvPicPr>
+          <p:cNvPr id="30" name="Immagine 29"/>
+          <p:cNvPicPr>
+            <a:picLocks noChangeAspect="1"/>
+          </p:cNvPicPr>
+          <p:nvPr/>
+        </p:nvPicPr>
+        <p:blipFill>
+          <a:blip r:embed="rId11">
+            <a:extLst>
+              <a:ext uri="{28A0092B-C50C-407E-A947-70E740481C1C}">
+                <a14:useLocalDpi xmlns:a14="http://schemas.microsoft.com/office/drawing/2010/main" val="0"/>
+              </a:ext>
+            </a:extLst>
+          </a:blip>
+          <a:stretch>
+            <a:fillRect/>
+          </a:stretch>
+        </p:blipFill>
+        <p:spPr>
+          <a:xfrm>
+            <a:off x="10528408" y="3309631"/>
+            <a:ext cx="819316" cy="819316"/>
+          </a:xfrm>
+          <a:prstGeom prst="rect">
+            <a:avLst/>
+          </a:prstGeom>
+        </p:spPr>
+      </p:pic>
+      <p:pic>
+        <p:nvPicPr>
+          <p:cNvPr id="33" name="Immagine 32"/>
+          <p:cNvPicPr>
+            <a:picLocks noChangeAspect="1"/>
+          </p:cNvPicPr>
+          <p:nvPr/>
+        </p:nvPicPr>
+        <p:blipFill>
+          <a:blip r:embed="rId12">
+            <a:extLst>
+              <a:ext uri="{28A0092B-C50C-407E-A947-70E740481C1C}">
+                <a14:useLocalDpi xmlns:a14="http://schemas.microsoft.com/office/drawing/2010/main" val="0"/>
+              </a:ext>
+            </a:extLst>
+          </a:blip>
+          <a:stretch>
+            <a:fillRect/>
+          </a:stretch>
+        </p:blipFill>
+        <p:spPr>
+          <a:xfrm>
+            <a:off x="10793702" y="257862"/>
+            <a:ext cx="1305359" cy="1305359"/>
+          </a:xfrm>
+          <a:prstGeom prst="rect">
+            <a:avLst/>
+          </a:prstGeom>
+        </p:spPr>
+      </p:pic>
+      <p:pic>
+        <p:nvPicPr>
+          <p:cNvPr id="34" name="Immagine 33"/>
+          <p:cNvPicPr>
+            <a:picLocks noChangeAspect="1"/>
+          </p:cNvPicPr>
+          <p:nvPr/>
+        </p:nvPicPr>
+        <p:blipFill>
+          <a:blip r:embed="rId13">
+            <a:extLst>
+              <a:ext uri="{28A0092B-C50C-407E-A947-70E740481C1C}">
+                <a14:useLocalDpi xmlns:a14="http://schemas.microsoft.com/office/drawing/2010/main" val="0"/>
+              </a:ext>
+            </a:extLst>
+          </a:blip>
+          <a:stretch>
+            <a:fillRect/>
+          </a:stretch>
+        </p:blipFill>
+        <p:spPr>
+          <a:xfrm>
+            <a:off x="8373097" y="3185780"/>
+            <a:ext cx="837653" cy="837653"/>
+          </a:xfrm>
+          <a:prstGeom prst="rect">
+            <a:avLst/>
+          </a:prstGeom>
+        </p:spPr>
+      </p:pic>
+      <p:pic>
+        <p:nvPicPr>
+          <p:cNvPr id="35" name="Immagine 34"/>
+          <p:cNvPicPr>
+            <a:picLocks noChangeAspect="1"/>
+          </p:cNvPicPr>
+          <p:nvPr/>
+        </p:nvPicPr>
+        <p:blipFill>
+          <a:blip r:embed="rId14">
+            <a:extLst>
+              <a:ext uri="{28A0092B-C50C-407E-A947-70E740481C1C}">
+                <a14:useLocalDpi xmlns:a14="http://schemas.microsoft.com/office/drawing/2010/main" val="0"/>
+              </a:ext>
+            </a:extLst>
+          </a:blip>
+          <a:stretch>
+            <a:fillRect/>
+          </a:stretch>
+        </p:blipFill>
+        <p:spPr>
+          <a:xfrm>
+            <a:off x="4789492" y="1470418"/>
+            <a:ext cx="759497" cy="759497"/>
+          </a:xfrm>
+          <a:prstGeom prst="rect">
+            <a:avLst/>
+          </a:prstGeom>
+        </p:spPr>
+      </p:pic>
+    </p:spTree>
+    <p:extLst>
+      <p:ext uri="{BB962C8B-B14F-4D97-AF65-F5344CB8AC3E}">
+        <p14:creationId xmlns:p14="http://schemas.microsoft.com/office/powerpoint/2010/main" val="1441132407"/>
       </p:ext>
     </p:extLst>
   </p:cSld>
@@ -11840,6 +14392,1979 @@
     <p:extLst>
       <p:ext uri="{BB962C8B-B14F-4D97-AF65-F5344CB8AC3E}">
         <p14:creationId xmlns:p14="http://schemas.microsoft.com/office/powerpoint/2010/main" val="1876781788"/>
+      </p:ext>
+    </p:extLst>
+  </p:cSld>
+  <p:clrMapOvr>
+    <a:masterClrMapping/>
+  </p:clrMapOvr>
+  <mc:AlternateContent xmlns:mc="http://schemas.openxmlformats.org/markup-compatibility/2006">
+    <mc:Choice xmlns:p14="http://schemas.microsoft.com/office/powerpoint/2010/main" Requires="p14">
+      <p:transition spd="med" p14:dur="700">
+        <p:fade/>
+      </p:transition>
+    </mc:Choice>
+    <mc:Fallback>
+      <p:transition spd="med">
+        <p:fade/>
+      </p:transition>
+    </mc:Fallback>
+  </mc:AlternateContent>
+  <p:timing>
+    <p:tnLst>
+      <p:par>
+        <p:cTn id="1" dur="indefinite" restart="never" nodeType="tmRoot"/>
+      </p:par>
+    </p:tnLst>
+  </p:timing>
+</p:sld>
+</file>
+
+<file path=ppt/slides/slide20.xml><?xml version="1.0" encoding="utf-8"?>
+<p:sld xmlns:a="http://schemas.openxmlformats.org/drawingml/2006/main" xmlns:r="http://schemas.openxmlformats.org/officeDocument/2006/relationships" xmlns:p="http://schemas.openxmlformats.org/presentationml/2006/main">
+  <p:cSld>
+    <p:spTree>
+      <p:nvGrpSpPr>
+        <p:cNvPr id="1" name=""/>
+        <p:cNvGrpSpPr/>
+        <p:nvPr/>
+      </p:nvGrpSpPr>
+      <p:grpSpPr>
+        <a:xfrm>
+          <a:off x="0" y="0"/>
+          <a:ext cx="0" cy="0"/>
+          <a:chOff x="0" y="0"/>
+          <a:chExt cx="0" cy="0"/>
+        </a:xfrm>
+      </p:grpSpPr>
+      <p:pic>
+        <p:nvPicPr>
+          <p:cNvPr id="23" name="Immagine 22"/>
+          <p:cNvPicPr>
+            <a:picLocks noChangeAspect="1"/>
+          </p:cNvPicPr>
+          <p:nvPr/>
+        </p:nvPicPr>
+        <p:blipFill>
+          <a:blip r:embed="rId3">
+            <a:alphaModFix amt="50000"/>
+            <a:extLst>
+              <a:ext uri="{28A0092B-C50C-407E-A947-70E740481C1C}">
+                <a14:useLocalDpi xmlns:a14="http://schemas.microsoft.com/office/drawing/2010/main" val="0"/>
+              </a:ext>
+            </a:extLst>
+          </a:blip>
+          <a:stretch>
+            <a:fillRect/>
+          </a:stretch>
+        </p:blipFill>
+        <p:spPr>
+          <a:xfrm>
+            <a:off x="-798149" y="0"/>
+            <a:ext cx="14025600" cy="7012800"/>
+          </a:xfrm>
+          <a:prstGeom prst="rect">
+            <a:avLst/>
+          </a:prstGeom>
+        </p:spPr>
+      </p:pic>
+      <p:sp>
+        <p:nvSpPr>
+          <p:cNvPr id="5" name="Segnaposto contenuto 2"/>
+          <p:cNvSpPr>
+            <a:spLocks noGrp="1"/>
+          </p:cNvSpPr>
+          <p:nvPr>
+            <p:ph idx="1"/>
+          </p:nvPr>
+        </p:nvSpPr>
+        <p:spPr>
+          <a:xfrm>
+            <a:off x="671947" y="1850167"/>
+            <a:ext cx="10131425" cy="4557560"/>
+          </a:xfrm>
+        </p:spPr>
+        <p:txBody>
+          <a:bodyPr>
+            <a:normAutofit/>
+          </a:bodyPr>
+          <a:lstStyle/>
+          <a:p>
+            <a:endParaRPr lang="en-GB" sz="4000" dirty="0" smtClean="0">
+              <a:latin typeface="+mj-lt"/>
+            </a:endParaRPr>
+          </a:p>
+          <a:p>
+            <a:endParaRPr lang="en-GB" sz="4000" dirty="0" smtClean="0">
+              <a:latin typeface="+mj-lt"/>
+            </a:endParaRPr>
+          </a:p>
+          <a:p>
+            <a:endParaRPr lang="en-GB" sz="4000" dirty="0">
+              <a:latin typeface="+mj-lt"/>
+            </a:endParaRPr>
+          </a:p>
+        </p:txBody>
+      </p:sp>
+      <p:sp>
+        <p:nvSpPr>
+          <p:cNvPr id="7" name="Titolo 1"/>
+          <p:cNvSpPr>
+            <a:spLocks noGrp="1"/>
+          </p:cNvSpPr>
+          <p:nvPr>
+            <p:ph type="title"/>
+          </p:nvPr>
+        </p:nvSpPr>
+        <p:spPr>
+          <a:xfrm>
+            <a:off x="387927" y="484909"/>
+            <a:ext cx="10131425" cy="1067385"/>
+          </a:xfrm>
+        </p:spPr>
+        <p:txBody>
+          <a:bodyPr>
+            <a:normAutofit/>
+          </a:bodyPr>
+          <a:lstStyle/>
+          <a:p>
+            <a:pPr marL="742950" marR="0" lvl="0" indent="-742950" defTabSz="914400" eaLnBrk="1" fontAlgn="auto" latinLnBrk="0" hangingPunct="1">
+              <a:lnSpc>
+                <a:spcPct val="100000"/>
+              </a:lnSpc>
+              <a:spcBef>
+                <a:spcPts val="0"/>
+              </a:spcBef>
+              <a:spcAft>
+                <a:spcPts val="0"/>
+              </a:spcAft>
+              <a:buClrTx/>
+              <a:buSzTx/>
+              <a:buFont typeface="+mj-lt"/>
+              <a:buNone/>
+              <a:tabLst/>
+              <a:defRPr/>
+            </a:pPr>
+            <a:r>
+              <a:rPr lang="en-GB" dirty="0" smtClean="0"/>
+              <a:t>3.1</a:t>
+            </a:r>
+            <a:r>
+              <a:rPr lang="en-GB" dirty="0" smtClean="0"/>
+              <a:t>	</a:t>
+            </a:r>
+            <a:r>
+              <a:rPr lang="en-GB" sz="4000" dirty="0" smtClean="0"/>
+              <a:t>Scenario Example</a:t>
+            </a:r>
+            <a:endParaRPr lang="en-GB" sz="4000" dirty="0"/>
+          </a:p>
+        </p:txBody>
+      </p:sp>
+      <p:sp>
+        <p:nvSpPr>
+          <p:cNvPr id="8" name="Segnaposto contenuto 2"/>
+          <p:cNvSpPr txBox="1">
+            <a:spLocks/>
+          </p:cNvSpPr>
+          <p:nvPr/>
+        </p:nvSpPr>
+        <p:spPr>
+          <a:xfrm>
+            <a:off x="824347" y="2002567"/>
+            <a:ext cx="10131425" cy="4557560"/>
+          </a:xfrm>
+          <a:prstGeom prst="rect">
+            <a:avLst/>
+          </a:prstGeom>
+        </p:spPr>
+        <p:txBody>
+          <a:bodyPr vert="horz" lIns="91440" tIns="45720" rIns="91440" bIns="45720" rtlCol="0" anchor="ctr">
+            <a:normAutofit/>
+          </a:bodyPr>
+          <a:lstStyle>
+            <a:lvl1pPr marL="285750" indent="-285750" algn="l" defTabSz="457200" rtl="0" eaLnBrk="1" latinLnBrk="0" hangingPunct="1">
+              <a:spcBef>
+                <a:spcPts val="0"/>
+              </a:spcBef>
+              <a:spcAft>
+                <a:spcPts val="1000"/>
+              </a:spcAft>
+              <a:buClr>
+                <a:schemeClr val="tx1"/>
+              </a:buClr>
+              <a:buSzPct val="100000"/>
+              <a:buFont typeface="Arial"/>
+              <a:buChar char="•"/>
+              <a:defRPr sz="1800" kern="1200" cap="none">
+                <a:solidFill>
+                  <a:schemeClr val="tx1"/>
+                </a:solidFill>
+                <a:effectLst/>
+                <a:latin typeface="+mn-lt"/>
+                <a:ea typeface="+mn-ea"/>
+                <a:cs typeface="+mn-cs"/>
+              </a:defRPr>
+            </a:lvl1pPr>
+            <a:lvl2pPr marL="742950" indent="-285750" algn="l" defTabSz="457200" rtl="0" eaLnBrk="1" latinLnBrk="0" hangingPunct="1">
+              <a:spcBef>
+                <a:spcPts val="0"/>
+              </a:spcBef>
+              <a:spcAft>
+                <a:spcPts val="1000"/>
+              </a:spcAft>
+              <a:buClr>
+                <a:schemeClr val="tx1"/>
+              </a:buClr>
+              <a:buSzPct val="100000"/>
+              <a:buFont typeface="Arial"/>
+              <a:buChar char="•"/>
+              <a:defRPr sz="1600" kern="1200" cap="none">
+                <a:solidFill>
+                  <a:schemeClr val="tx1"/>
+                </a:solidFill>
+                <a:effectLst/>
+                <a:latin typeface="+mn-lt"/>
+                <a:ea typeface="+mn-ea"/>
+                <a:cs typeface="+mn-cs"/>
+              </a:defRPr>
+            </a:lvl2pPr>
+            <a:lvl3pPr marL="1200150" indent="-285750" algn="l" defTabSz="457200" rtl="0" eaLnBrk="1" latinLnBrk="0" hangingPunct="1">
+              <a:spcBef>
+                <a:spcPts val="0"/>
+              </a:spcBef>
+              <a:spcAft>
+                <a:spcPts val="1000"/>
+              </a:spcAft>
+              <a:buClr>
+                <a:schemeClr val="tx1"/>
+              </a:buClr>
+              <a:buSzPct val="100000"/>
+              <a:buFont typeface="Arial"/>
+              <a:buChar char="•"/>
+              <a:defRPr sz="1400" kern="1200" cap="none">
+                <a:solidFill>
+                  <a:schemeClr val="tx1"/>
+                </a:solidFill>
+                <a:effectLst/>
+                <a:latin typeface="+mn-lt"/>
+                <a:ea typeface="+mn-ea"/>
+                <a:cs typeface="+mn-cs"/>
+              </a:defRPr>
+            </a:lvl3pPr>
+            <a:lvl4pPr marL="1543050" indent="-171450" algn="l" defTabSz="457200" rtl="0" eaLnBrk="1" latinLnBrk="0" hangingPunct="1">
+              <a:spcBef>
+                <a:spcPts val="0"/>
+              </a:spcBef>
+              <a:spcAft>
+                <a:spcPts val="1000"/>
+              </a:spcAft>
+              <a:buClr>
+                <a:schemeClr val="tx1"/>
+              </a:buClr>
+              <a:buSzPct val="100000"/>
+              <a:buFont typeface="Arial"/>
+              <a:buChar char="•"/>
+              <a:defRPr sz="1200" kern="1200" cap="none">
+                <a:solidFill>
+                  <a:schemeClr val="tx1"/>
+                </a:solidFill>
+                <a:effectLst/>
+                <a:latin typeface="+mn-lt"/>
+                <a:ea typeface="+mn-ea"/>
+                <a:cs typeface="+mn-cs"/>
+              </a:defRPr>
+            </a:lvl4pPr>
+            <a:lvl5pPr marL="2000250" indent="-171450" algn="l" defTabSz="457200" rtl="0" eaLnBrk="1" latinLnBrk="0" hangingPunct="1">
+              <a:spcBef>
+                <a:spcPts val="0"/>
+              </a:spcBef>
+              <a:spcAft>
+                <a:spcPts val="1000"/>
+              </a:spcAft>
+              <a:buClr>
+                <a:schemeClr val="tx1"/>
+              </a:buClr>
+              <a:buSzPct val="100000"/>
+              <a:buFont typeface="Arial"/>
+              <a:buChar char="•"/>
+              <a:defRPr sz="1200" kern="1200" cap="none">
+                <a:solidFill>
+                  <a:schemeClr val="tx1"/>
+                </a:solidFill>
+                <a:effectLst/>
+                <a:latin typeface="+mn-lt"/>
+                <a:ea typeface="+mn-ea"/>
+                <a:cs typeface="+mn-cs"/>
+              </a:defRPr>
+            </a:lvl5pPr>
+            <a:lvl6pPr marL="2514600" indent="-228600" algn="l" defTabSz="457200" rtl="0" eaLnBrk="1" latinLnBrk="0" hangingPunct="1">
+              <a:spcBef>
+                <a:spcPts val="0"/>
+              </a:spcBef>
+              <a:spcAft>
+                <a:spcPts val="1000"/>
+              </a:spcAft>
+              <a:buClr>
+                <a:schemeClr val="tx1"/>
+              </a:buClr>
+              <a:buSzPct val="100000"/>
+              <a:buFont typeface="Arial"/>
+              <a:buChar char="•"/>
+              <a:defRPr sz="1200" kern="1200" cap="none">
+                <a:solidFill>
+                  <a:schemeClr val="tx1"/>
+                </a:solidFill>
+                <a:effectLst/>
+                <a:latin typeface="+mn-lt"/>
+                <a:ea typeface="+mn-ea"/>
+                <a:cs typeface="+mn-cs"/>
+              </a:defRPr>
+            </a:lvl6pPr>
+            <a:lvl7pPr marL="2971800" indent="-228600" algn="l" defTabSz="457200" rtl="0" eaLnBrk="1" latinLnBrk="0" hangingPunct="1">
+              <a:spcBef>
+                <a:spcPts val="0"/>
+              </a:spcBef>
+              <a:spcAft>
+                <a:spcPts val="1000"/>
+              </a:spcAft>
+              <a:buClr>
+                <a:schemeClr val="tx1"/>
+              </a:buClr>
+              <a:buSzPct val="100000"/>
+              <a:buFont typeface="Arial"/>
+              <a:buChar char="•"/>
+              <a:defRPr sz="1200" kern="1200" cap="none">
+                <a:solidFill>
+                  <a:schemeClr val="tx1"/>
+                </a:solidFill>
+                <a:effectLst/>
+                <a:latin typeface="+mn-lt"/>
+                <a:ea typeface="+mn-ea"/>
+                <a:cs typeface="+mn-cs"/>
+              </a:defRPr>
+            </a:lvl7pPr>
+            <a:lvl8pPr marL="3429000" indent="-228600" algn="l" defTabSz="457200" rtl="0" eaLnBrk="1" latinLnBrk="0" hangingPunct="1">
+              <a:spcBef>
+                <a:spcPts val="0"/>
+              </a:spcBef>
+              <a:spcAft>
+                <a:spcPts val="1000"/>
+              </a:spcAft>
+              <a:buClr>
+                <a:schemeClr val="tx1"/>
+              </a:buClr>
+              <a:buSzPct val="100000"/>
+              <a:buFont typeface="Arial"/>
+              <a:buChar char="•"/>
+              <a:defRPr sz="1200" kern="1200" cap="none">
+                <a:solidFill>
+                  <a:schemeClr val="tx1"/>
+                </a:solidFill>
+                <a:effectLst/>
+                <a:latin typeface="+mn-lt"/>
+                <a:ea typeface="+mn-ea"/>
+                <a:cs typeface="+mn-cs"/>
+              </a:defRPr>
+            </a:lvl8pPr>
+            <a:lvl9pPr marL="3886200" indent="-228600" algn="l" defTabSz="457200" rtl="0" eaLnBrk="1" latinLnBrk="0" hangingPunct="1">
+              <a:spcBef>
+                <a:spcPts val="0"/>
+              </a:spcBef>
+              <a:spcAft>
+                <a:spcPts val="1000"/>
+              </a:spcAft>
+              <a:buClr>
+                <a:schemeClr val="tx1"/>
+              </a:buClr>
+              <a:buSzPct val="100000"/>
+              <a:buFont typeface="Arial"/>
+              <a:buChar char="•"/>
+              <a:defRPr sz="1200" kern="1200" cap="none">
+                <a:solidFill>
+                  <a:schemeClr val="tx1"/>
+                </a:solidFill>
+                <a:effectLst/>
+                <a:latin typeface="+mn-lt"/>
+                <a:ea typeface="+mn-ea"/>
+                <a:cs typeface="+mn-cs"/>
+              </a:defRPr>
+            </a:lvl9pPr>
+          </a:lstStyle>
+          <a:p>
+            <a:endParaRPr lang="en-GB" sz="4000" dirty="0" smtClean="0">
+              <a:latin typeface="+mj-lt"/>
+            </a:endParaRPr>
+          </a:p>
+          <a:p>
+            <a:endParaRPr lang="en-GB" sz="4000" dirty="0" smtClean="0">
+              <a:latin typeface="+mj-lt"/>
+            </a:endParaRPr>
+          </a:p>
+          <a:p>
+            <a:endParaRPr lang="en-GB" sz="4000" dirty="0">
+              <a:latin typeface="+mj-lt"/>
+            </a:endParaRPr>
+          </a:p>
+        </p:txBody>
+      </p:sp>
+      <p:cxnSp>
+        <p:nvCxnSpPr>
+          <p:cNvPr id="15" name="Connettore 2 14"/>
+          <p:cNvCxnSpPr/>
+          <p:nvPr/>
+        </p:nvCxnSpPr>
+        <p:spPr>
+          <a:xfrm>
+            <a:off x="4352499" y="2466490"/>
+            <a:ext cx="3272495" cy="8299"/>
+          </a:xfrm>
+          <a:prstGeom prst="straightConnector1">
+            <a:avLst/>
+          </a:prstGeom>
+          <a:ln w="57150">
+            <a:tailEnd type="triangle"/>
+          </a:ln>
+        </p:spPr>
+        <p:style>
+          <a:lnRef idx="1">
+            <a:schemeClr val="accent1"/>
+          </a:lnRef>
+          <a:fillRef idx="0">
+            <a:schemeClr val="accent1"/>
+          </a:fillRef>
+          <a:effectRef idx="0">
+            <a:schemeClr val="accent1"/>
+          </a:effectRef>
+          <a:fontRef idx="minor">
+            <a:schemeClr val="tx1"/>
+          </a:fontRef>
+        </p:style>
+      </p:cxnSp>
+      <p:pic>
+        <p:nvPicPr>
+          <p:cNvPr id="16" name="Immagine 15"/>
+          <p:cNvPicPr>
+            <a:picLocks noChangeAspect="1"/>
+          </p:cNvPicPr>
+          <p:nvPr/>
+        </p:nvPicPr>
+        <p:blipFill>
+          <a:blip r:embed="rId4">
+            <a:extLst>
+              <a:ext uri="{28A0092B-C50C-407E-A947-70E740481C1C}">
+                <a14:useLocalDpi xmlns:a14="http://schemas.microsoft.com/office/drawing/2010/main"/>
+              </a:ext>
+            </a:extLst>
+          </a:blip>
+          <a:stretch>
+            <a:fillRect/>
+          </a:stretch>
+        </p:blipFill>
+        <p:spPr>
+          <a:xfrm>
+            <a:off x="1743827" y="2200048"/>
+            <a:ext cx="2174528" cy="2178152"/>
+          </a:xfrm>
+          <a:prstGeom prst="rect">
+            <a:avLst/>
+          </a:prstGeom>
+        </p:spPr>
+      </p:pic>
+      <p:pic>
+        <p:nvPicPr>
+          <p:cNvPr id="20" name="Immagine 19"/>
+          <p:cNvPicPr>
+            <a:picLocks noChangeAspect="1"/>
+          </p:cNvPicPr>
+          <p:nvPr/>
+        </p:nvPicPr>
+        <p:blipFill>
+          <a:blip r:embed="rId5">
+            <a:extLst>
+              <a:ext uri="{28A0092B-C50C-407E-A947-70E740481C1C}">
+                <a14:useLocalDpi xmlns:a14="http://schemas.microsoft.com/office/drawing/2010/main" val="0"/>
+              </a:ext>
+            </a:extLst>
+          </a:blip>
+          <a:stretch>
+            <a:fillRect/>
+          </a:stretch>
+        </p:blipFill>
+        <p:spPr>
+          <a:xfrm>
+            <a:off x="4833363" y="4241699"/>
+            <a:ext cx="1688132" cy="1575590"/>
+          </a:xfrm>
+          <a:prstGeom prst="rect">
+            <a:avLst/>
+          </a:prstGeom>
+        </p:spPr>
+      </p:pic>
+      <p:cxnSp>
+        <p:nvCxnSpPr>
+          <p:cNvPr id="21" name="Connettore 2 20"/>
+          <p:cNvCxnSpPr/>
+          <p:nvPr/>
+        </p:nvCxnSpPr>
+        <p:spPr>
+          <a:xfrm flipH="1" flipV="1">
+            <a:off x="4544832" y="3826868"/>
+            <a:ext cx="4118283" cy="1146127"/>
+          </a:xfrm>
+          <a:prstGeom prst="straightConnector1">
+            <a:avLst/>
+          </a:prstGeom>
+          <a:ln w="57150">
+            <a:tailEnd type="triangle"/>
+          </a:ln>
+        </p:spPr>
+        <p:style>
+          <a:lnRef idx="1">
+            <a:schemeClr val="accent1"/>
+          </a:lnRef>
+          <a:fillRef idx="0">
+            <a:schemeClr val="accent1"/>
+          </a:fillRef>
+          <a:effectRef idx="0">
+            <a:schemeClr val="accent1"/>
+          </a:effectRef>
+          <a:fontRef idx="minor">
+            <a:schemeClr val="tx1"/>
+          </a:fontRef>
+        </p:style>
+      </p:cxnSp>
+      <p:pic>
+        <p:nvPicPr>
+          <p:cNvPr id="24" name="Immagine 23"/>
+          <p:cNvPicPr>
+            <a:picLocks noChangeAspect="1"/>
+          </p:cNvPicPr>
+          <p:nvPr/>
+        </p:nvPicPr>
+        <p:blipFill>
+          <a:blip r:embed="rId6">
+            <a:extLst>
+              <a:ext uri="{28A0092B-C50C-407E-A947-70E740481C1C}">
+                <a14:useLocalDpi xmlns:a14="http://schemas.microsoft.com/office/drawing/2010/main"/>
+              </a:ext>
+            </a:extLst>
+          </a:blip>
+          <a:stretch>
+            <a:fillRect/>
+          </a:stretch>
+        </p:blipFill>
+        <p:spPr>
+          <a:xfrm>
+            <a:off x="8663115" y="193127"/>
+            <a:ext cx="2397825" cy="2397825"/>
+          </a:xfrm>
+          <a:prstGeom prst="rect">
+            <a:avLst/>
+          </a:prstGeom>
+        </p:spPr>
+      </p:pic>
+      <p:pic>
+        <p:nvPicPr>
+          <p:cNvPr id="22" name="Immagine 21"/>
+          <p:cNvPicPr>
+            <a:picLocks noChangeAspect="1"/>
+          </p:cNvPicPr>
+          <p:nvPr/>
+        </p:nvPicPr>
+        <p:blipFill>
+          <a:blip r:embed="rId7">
+            <a:extLst>
+              <a:ext uri="{28A0092B-C50C-407E-A947-70E740481C1C}">
+                <a14:useLocalDpi xmlns:a14="http://schemas.microsoft.com/office/drawing/2010/main"/>
+              </a:ext>
+            </a:extLst>
+          </a:blip>
+          <a:stretch>
+            <a:fillRect/>
+          </a:stretch>
+        </p:blipFill>
+        <p:spPr>
+          <a:xfrm>
+            <a:off x="5823339" y="1439713"/>
+            <a:ext cx="799053" cy="799053"/>
+          </a:xfrm>
+          <a:prstGeom prst="rect">
+            <a:avLst/>
+          </a:prstGeom>
+        </p:spPr>
+      </p:pic>
+      <p:pic>
+        <p:nvPicPr>
+          <p:cNvPr id="3" name="Immagine 2"/>
+          <p:cNvPicPr>
+            <a:picLocks noChangeAspect="1"/>
+          </p:cNvPicPr>
+          <p:nvPr/>
+        </p:nvPicPr>
+        <p:blipFill>
+          <a:blip r:embed="rId8">
+            <a:extLst>
+              <a:ext uri="{28A0092B-C50C-407E-A947-70E740481C1C}">
+                <a14:useLocalDpi xmlns:a14="http://schemas.microsoft.com/office/drawing/2010/main" val="0"/>
+              </a:ext>
+            </a:extLst>
+          </a:blip>
+          <a:stretch>
+            <a:fillRect/>
+          </a:stretch>
+        </p:blipFill>
+        <p:spPr>
+          <a:xfrm>
+            <a:off x="10125483" y="2339552"/>
+            <a:ext cx="604326" cy="251400"/>
+          </a:xfrm>
+          <a:prstGeom prst="rect">
+            <a:avLst/>
+          </a:prstGeom>
+        </p:spPr>
+      </p:pic>
+      <p:pic>
+        <p:nvPicPr>
+          <p:cNvPr id="4" name="Immagine 3"/>
+          <p:cNvPicPr>
+            <a:picLocks noChangeAspect="1"/>
+          </p:cNvPicPr>
+          <p:nvPr/>
+        </p:nvPicPr>
+        <p:blipFill>
+          <a:blip r:embed="rId9"/>
+          <a:stretch>
+            <a:fillRect/>
+          </a:stretch>
+        </p:blipFill>
+        <p:spPr>
+          <a:xfrm>
+            <a:off x="9064487" y="4591700"/>
+            <a:ext cx="1665322" cy="1665322"/>
+          </a:xfrm>
+          <a:prstGeom prst="rect">
+            <a:avLst/>
+          </a:prstGeom>
+        </p:spPr>
+      </p:pic>
+      <p:cxnSp>
+        <p:nvCxnSpPr>
+          <p:cNvPr id="25" name="Connettore 2 24"/>
+          <p:cNvCxnSpPr/>
+          <p:nvPr/>
+        </p:nvCxnSpPr>
+        <p:spPr>
+          <a:xfrm>
+            <a:off x="9283147" y="2877898"/>
+            <a:ext cx="0" cy="1500302"/>
+          </a:xfrm>
+          <a:prstGeom prst="straightConnector1">
+            <a:avLst/>
+          </a:prstGeom>
+          <a:ln w="57150">
+            <a:prstDash val="dash"/>
+            <a:tailEnd type="triangle"/>
+          </a:ln>
+        </p:spPr>
+        <p:style>
+          <a:lnRef idx="1">
+            <a:schemeClr val="accent1"/>
+          </a:lnRef>
+          <a:fillRef idx="0">
+            <a:schemeClr val="accent1"/>
+          </a:fillRef>
+          <a:effectRef idx="0">
+            <a:schemeClr val="accent1"/>
+          </a:effectRef>
+          <a:fontRef idx="minor">
+            <a:schemeClr val="tx1"/>
+          </a:fontRef>
+        </p:style>
+      </p:cxnSp>
+      <p:cxnSp>
+        <p:nvCxnSpPr>
+          <p:cNvPr id="26" name="Connettore 2 25"/>
+          <p:cNvCxnSpPr/>
+          <p:nvPr/>
+        </p:nvCxnSpPr>
+        <p:spPr>
+          <a:xfrm flipV="1">
+            <a:off x="10284152" y="2827725"/>
+            <a:ext cx="23630" cy="1466102"/>
+          </a:xfrm>
+          <a:prstGeom prst="straightConnector1">
+            <a:avLst/>
+          </a:prstGeom>
+          <a:ln w="57150">
+            <a:prstDash val="dash"/>
+            <a:tailEnd type="triangle"/>
+          </a:ln>
+        </p:spPr>
+        <p:style>
+          <a:lnRef idx="1">
+            <a:schemeClr val="accent1"/>
+          </a:lnRef>
+          <a:fillRef idx="0">
+            <a:schemeClr val="accent1"/>
+          </a:fillRef>
+          <a:effectRef idx="0">
+            <a:schemeClr val="accent1"/>
+          </a:effectRef>
+          <a:fontRef idx="minor">
+            <a:schemeClr val="tx1"/>
+          </a:fontRef>
+        </p:style>
+      </p:cxnSp>
+      <p:pic>
+        <p:nvPicPr>
+          <p:cNvPr id="29" name="Immagine 28"/>
+          <p:cNvPicPr>
+            <a:picLocks noChangeAspect="1"/>
+          </p:cNvPicPr>
+          <p:nvPr/>
+        </p:nvPicPr>
+        <p:blipFill>
+          <a:blip r:embed="rId10">
+            <a:extLst>
+              <a:ext uri="{28A0092B-C50C-407E-A947-70E740481C1C}">
+                <a14:useLocalDpi xmlns:a14="http://schemas.microsoft.com/office/drawing/2010/main"/>
+              </a:ext>
+            </a:extLst>
+          </a:blip>
+          <a:stretch>
+            <a:fillRect/>
+          </a:stretch>
+        </p:blipFill>
+        <p:spPr>
+          <a:xfrm>
+            <a:off x="7445842" y="5909873"/>
+            <a:ext cx="694298" cy="694298"/>
+          </a:xfrm>
+          <a:prstGeom prst="rect">
+            <a:avLst/>
+          </a:prstGeom>
+        </p:spPr>
+      </p:pic>
+      <p:pic>
+        <p:nvPicPr>
+          <p:cNvPr id="30" name="Immagine 29"/>
+          <p:cNvPicPr>
+            <a:picLocks noChangeAspect="1"/>
+          </p:cNvPicPr>
+          <p:nvPr/>
+        </p:nvPicPr>
+        <p:blipFill>
+          <a:blip r:embed="rId11">
+            <a:extLst>
+              <a:ext uri="{28A0092B-C50C-407E-A947-70E740481C1C}">
+                <a14:useLocalDpi xmlns:a14="http://schemas.microsoft.com/office/drawing/2010/main" val="0"/>
+              </a:ext>
+            </a:extLst>
+          </a:blip>
+          <a:stretch>
+            <a:fillRect/>
+          </a:stretch>
+        </p:blipFill>
+        <p:spPr>
+          <a:xfrm>
+            <a:off x="10528408" y="3309631"/>
+            <a:ext cx="819316" cy="819316"/>
+          </a:xfrm>
+          <a:prstGeom prst="rect">
+            <a:avLst/>
+          </a:prstGeom>
+        </p:spPr>
+      </p:pic>
+      <p:pic>
+        <p:nvPicPr>
+          <p:cNvPr id="33" name="Immagine 32"/>
+          <p:cNvPicPr>
+            <a:picLocks noChangeAspect="1"/>
+          </p:cNvPicPr>
+          <p:nvPr/>
+        </p:nvPicPr>
+        <p:blipFill>
+          <a:blip r:embed="rId12">
+            <a:extLst>
+              <a:ext uri="{28A0092B-C50C-407E-A947-70E740481C1C}">
+                <a14:useLocalDpi xmlns:a14="http://schemas.microsoft.com/office/drawing/2010/main" val="0"/>
+              </a:ext>
+            </a:extLst>
+          </a:blip>
+          <a:stretch>
+            <a:fillRect/>
+          </a:stretch>
+        </p:blipFill>
+        <p:spPr>
+          <a:xfrm>
+            <a:off x="10793702" y="257862"/>
+            <a:ext cx="1305359" cy="1305359"/>
+          </a:xfrm>
+          <a:prstGeom prst="rect">
+            <a:avLst/>
+          </a:prstGeom>
+        </p:spPr>
+      </p:pic>
+      <p:pic>
+        <p:nvPicPr>
+          <p:cNvPr id="34" name="Immagine 33"/>
+          <p:cNvPicPr>
+            <a:picLocks noChangeAspect="1"/>
+          </p:cNvPicPr>
+          <p:nvPr/>
+        </p:nvPicPr>
+        <p:blipFill>
+          <a:blip r:embed="rId13">
+            <a:extLst>
+              <a:ext uri="{28A0092B-C50C-407E-A947-70E740481C1C}">
+                <a14:useLocalDpi xmlns:a14="http://schemas.microsoft.com/office/drawing/2010/main" val="0"/>
+              </a:ext>
+            </a:extLst>
+          </a:blip>
+          <a:stretch>
+            <a:fillRect/>
+          </a:stretch>
+        </p:blipFill>
+        <p:spPr>
+          <a:xfrm>
+            <a:off x="8373097" y="3185780"/>
+            <a:ext cx="837653" cy="837653"/>
+          </a:xfrm>
+          <a:prstGeom prst="rect">
+            <a:avLst/>
+          </a:prstGeom>
+        </p:spPr>
+      </p:pic>
+      <p:pic>
+        <p:nvPicPr>
+          <p:cNvPr id="35" name="Immagine 34"/>
+          <p:cNvPicPr>
+            <a:picLocks noChangeAspect="1"/>
+          </p:cNvPicPr>
+          <p:nvPr/>
+        </p:nvPicPr>
+        <p:blipFill>
+          <a:blip r:embed="rId14">
+            <a:extLst>
+              <a:ext uri="{28A0092B-C50C-407E-A947-70E740481C1C}">
+                <a14:useLocalDpi xmlns:a14="http://schemas.microsoft.com/office/drawing/2010/main" val="0"/>
+              </a:ext>
+            </a:extLst>
+          </a:blip>
+          <a:stretch>
+            <a:fillRect/>
+          </a:stretch>
+        </p:blipFill>
+        <p:spPr>
+          <a:xfrm>
+            <a:off x="4789492" y="1470418"/>
+            <a:ext cx="759497" cy="759497"/>
+          </a:xfrm>
+          <a:prstGeom prst="rect">
+            <a:avLst/>
+          </a:prstGeom>
+        </p:spPr>
+      </p:pic>
+      <p:pic>
+        <p:nvPicPr>
+          <p:cNvPr id="6" name="Immagine 5"/>
+          <p:cNvPicPr>
+            <a:picLocks noChangeAspect="1"/>
+          </p:cNvPicPr>
+          <p:nvPr/>
+        </p:nvPicPr>
+        <p:blipFill>
+          <a:blip r:embed="rId15">
+            <a:extLst>
+              <a:ext uri="{28A0092B-C50C-407E-A947-70E740481C1C}">
+                <a14:useLocalDpi xmlns:a14="http://schemas.microsoft.com/office/drawing/2010/main" val="0"/>
+              </a:ext>
+            </a:extLst>
+          </a:blip>
+          <a:stretch>
+            <a:fillRect/>
+          </a:stretch>
+        </p:blipFill>
+        <p:spPr>
+          <a:xfrm>
+            <a:off x="2516808" y="2811669"/>
+            <a:ext cx="541240" cy="541240"/>
+          </a:xfrm>
+          <a:prstGeom prst="rect">
+            <a:avLst/>
+          </a:prstGeom>
+        </p:spPr>
+      </p:pic>
+      <p:pic>
+        <p:nvPicPr>
+          <p:cNvPr id="9" name="Immagine 8"/>
+          <p:cNvPicPr>
+            <a:picLocks noChangeAspect="1"/>
+          </p:cNvPicPr>
+          <p:nvPr/>
+        </p:nvPicPr>
+        <p:blipFill>
+          <a:blip r:embed="rId16">
+            <a:extLst>
+              <a:ext uri="{28A0092B-C50C-407E-A947-70E740481C1C}">
+                <a14:useLocalDpi xmlns:a14="http://schemas.microsoft.com/office/drawing/2010/main" val="0"/>
+              </a:ext>
+            </a:extLst>
+          </a:blip>
+          <a:stretch>
+            <a:fillRect/>
+          </a:stretch>
+        </p:blipFill>
+        <p:spPr>
+          <a:xfrm>
+            <a:off x="7377949" y="4972995"/>
+            <a:ext cx="844636" cy="844636"/>
+          </a:xfrm>
+          <a:prstGeom prst="rect">
+            <a:avLst/>
+          </a:prstGeom>
+        </p:spPr>
+      </p:pic>
+      <p:pic>
+        <p:nvPicPr>
+          <p:cNvPr id="10" name="Immagine 9"/>
+          <p:cNvPicPr>
+            <a:picLocks noChangeAspect="1"/>
+          </p:cNvPicPr>
+          <p:nvPr/>
+        </p:nvPicPr>
+        <p:blipFill>
+          <a:blip r:embed="rId17">
+            <a:extLst>
+              <a:ext uri="{28A0092B-C50C-407E-A947-70E740481C1C}">
+                <a14:useLocalDpi xmlns:a14="http://schemas.microsoft.com/office/drawing/2010/main" val="0"/>
+              </a:ext>
+            </a:extLst>
+          </a:blip>
+          <a:stretch>
+            <a:fillRect/>
+          </a:stretch>
+        </p:blipFill>
+        <p:spPr>
+          <a:xfrm flipH="1">
+            <a:off x="76403" y="1323089"/>
+            <a:ext cx="1944815" cy="1944815"/>
+          </a:xfrm>
+          <a:prstGeom prst="rect">
+            <a:avLst/>
+          </a:prstGeom>
+        </p:spPr>
+      </p:pic>
+    </p:spTree>
+    <p:extLst>
+      <p:ext uri="{BB962C8B-B14F-4D97-AF65-F5344CB8AC3E}">
+        <p14:creationId xmlns:p14="http://schemas.microsoft.com/office/powerpoint/2010/main" val="424052705"/>
+      </p:ext>
+    </p:extLst>
+  </p:cSld>
+  <p:clrMapOvr>
+    <a:masterClrMapping/>
+  </p:clrMapOvr>
+  <mc:AlternateContent xmlns:mc="http://schemas.openxmlformats.org/markup-compatibility/2006">
+    <mc:Choice xmlns:p14="http://schemas.microsoft.com/office/powerpoint/2010/main" Requires="p14">
+      <p:transition spd="med" p14:dur="700">
+        <p:fade/>
+      </p:transition>
+    </mc:Choice>
+    <mc:Fallback>
+      <p:transition spd="med">
+        <p:fade/>
+      </p:transition>
+    </mc:Fallback>
+  </mc:AlternateContent>
+  <p:timing>
+    <p:tnLst>
+      <p:par>
+        <p:cTn id="1" dur="indefinite" restart="never" nodeType="tmRoot"/>
+      </p:par>
+    </p:tnLst>
+  </p:timing>
+</p:sld>
+</file>
+
+<file path=ppt/slides/slide21.xml><?xml version="1.0" encoding="utf-8"?>
+<p:sld xmlns:a="http://schemas.openxmlformats.org/drawingml/2006/main" xmlns:r="http://schemas.openxmlformats.org/officeDocument/2006/relationships" xmlns:p="http://schemas.openxmlformats.org/presentationml/2006/main">
+  <p:cSld>
+    <p:spTree>
+      <p:nvGrpSpPr>
+        <p:cNvPr id="1" name=""/>
+        <p:cNvGrpSpPr/>
+        <p:nvPr/>
+      </p:nvGrpSpPr>
+      <p:grpSpPr>
+        <a:xfrm>
+          <a:off x="0" y="0"/>
+          <a:ext cx="0" cy="0"/>
+          <a:chOff x="0" y="0"/>
+          <a:chExt cx="0" cy="0"/>
+        </a:xfrm>
+      </p:grpSpPr>
+      <p:sp>
+        <p:nvSpPr>
+          <p:cNvPr id="5" name="Segnaposto contenuto 2"/>
+          <p:cNvSpPr>
+            <a:spLocks noGrp="1"/>
+          </p:cNvSpPr>
+          <p:nvPr>
+            <p:ph idx="1"/>
+          </p:nvPr>
+        </p:nvSpPr>
+        <p:spPr>
+          <a:xfrm>
+            <a:off x="671947" y="1850167"/>
+            <a:ext cx="10131425" cy="4557560"/>
+          </a:xfrm>
+        </p:spPr>
+        <p:txBody>
+          <a:bodyPr>
+            <a:normAutofit/>
+          </a:bodyPr>
+          <a:lstStyle/>
+          <a:p>
+            <a:endParaRPr lang="en-GB" sz="4000" dirty="0" smtClean="0">
+              <a:latin typeface="+mj-lt"/>
+            </a:endParaRPr>
+          </a:p>
+          <a:p>
+            <a:endParaRPr lang="en-GB" sz="4000" dirty="0" smtClean="0">
+              <a:latin typeface="+mj-lt"/>
+            </a:endParaRPr>
+          </a:p>
+          <a:p>
+            <a:endParaRPr lang="en-GB" sz="4000" dirty="0">
+              <a:latin typeface="+mj-lt"/>
+            </a:endParaRPr>
+          </a:p>
+        </p:txBody>
+      </p:sp>
+      <p:pic>
+        <p:nvPicPr>
+          <p:cNvPr id="2" name="Immagine 1"/>
+          <p:cNvPicPr>
+            <a:picLocks noChangeAspect="1"/>
+          </p:cNvPicPr>
+          <p:nvPr/>
+        </p:nvPicPr>
+        <p:blipFill>
+          <a:blip r:embed="rId3">
+            <a:alphaModFix amt="50000"/>
+            <a:extLst>
+              <a:ext uri="{28A0092B-C50C-407E-A947-70E740481C1C}">
+                <a14:useLocalDpi xmlns:a14="http://schemas.microsoft.com/office/drawing/2010/main" val="0"/>
+              </a:ext>
+            </a:extLst>
+          </a:blip>
+          <a:stretch>
+            <a:fillRect/>
+          </a:stretch>
+        </p:blipFill>
+        <p:spPr>
+          <a:xfrm>
+            <a:off x="-844117" y="0"/>
+            <a:ext cx="14025600" cy="7012800"/>
+          </a:xfrm>
+          <a:prstGeom prst="rect">
+            <a:avLst/>
+          </a:prstGeom>
+        </p:spPr>
+      </p:pic>
+      <p:sp>
+        <p:nvSpPr>
+          <p:cNvPr id="7" name="Titolo 1"/>
+          <p:cNvSpPr>
+            <a:spLocks noGrp="1"/>
+          </p:cNvSpPr>
+          <p:nvPr>
+            <p:ph type="title"/>
+          </p:nvPr>
+        </p:nvSpPr>
+        <p:spPr>
+          <a:xfrm>
+            <a:off x="387927" y="484909"/>
+            <a:ext cx="11804073" cy="1067385"/>
+          </a:xfrm>
+        </p:spPr>
+        <p:txBody>
+          <a:bodyPr>
+            <a:noAutofit/>
+          </a:bodyPr>
+          <a:lstStyle/>
+          <a:p>
+            <a:pPr marL="742950" indent="-742950" defTabSz="914400">
+              <a:spcBef>
+                <a:spcPts val="0"/>
+              </a:spcBef>
+              <a:defRPr/>
+            </a:pPr>
+            <a:r>
+              <a:rPr lang="en-GB" sz="4000" dirty="0" smtClean="0"/>
+              <a:t>3.2 </a:t>
+            </a:r>
+            <a:r>
+              <a:rPr lang="en-GB" sz="4000" dirty="0"/>
+              <a:t>Traditional </a:t>
+            </a:r>
+            <a:r>
+              <a:rPr lang="en-GB" sz="4000" dirty="0" err="1" smtClean="0"/>
+              <a:t>ContractS</a:t>
+            </a:r>
+            <a:r>
+              <a:rPr lang="en-GB" sz="4000" dirty="0" smtClean="0"/>
+              <a:t> </a:t>
+            </a:r>
+            <a:r>
+              <a:rPr lang="en-GB" sz="4000" dirty="0"/>
+              <a:t>vs. Smart Contracts</a:t>
+            </a:r>
+            <a:br>
+              <a:rPr lang="en-GB" sz="4000" dirty="0"/>
+            </a:br>
+            <a:endParaRPr lang="en-GB" sz="4000" dirty="0"/>
+          </a:p>
+        </p:txBody>
+      </p:sp>
+      <p:sp>
+        <p:nvSpPr>
+          <p:cNvPr id="8" name="Segnaposto contenuto 2"/>
+          <p:cNvSpPr txBox="1">
+            <a:spLocks/>
+          </p:cNvSpPr>
+          <p:nvPr/>
+        </p:nvSpPr>
+        <p:spPr>
+          <a:xfrm>
+            <a:off x="824347" y="2002567"/>
+            <a:ext cx="10131425" cy="4557560"/>
+          </a:xfrm>
+          <a:prstGeom prst="rect">
+            <a:avLst/>
+          </a:prstGeom>
+        </p:spPr>
+        <p:txBody>
+          <a:bodyPr vert="horz" lIns="91440" tIns="45720" rIns="91440" bIns="45720" rtlCol="0" anchor="ctr">
+            <a:normAutofit/>
+          </a:bodyPr>
+          <a:lstStyle>
+            <a:lvl1pPr marL="285750" indent="-285750" algn="l" defTabSz="457200" rtl="0" eaLnBrk="1" latinLnBrk="0" hangingPunct="1">
+              <a:spcBef>
+                <a:spcPts val="0"/>
+              </a:spcBef>
+              <a:spcAft>
+                <a:spcPts val="1000"/>
+              </a:spcAft>
+              <a:buClr>
+                <a:schemeClr val="tx1"/>
+              </a:buClr>
+              <a:buSzPct val="100000"/>
+              <a:buFont typeface="Arial"/>
+              <a:buChar char="•"/>
+              <a:defRPr sz="1800" kern="1200" cap="none">
+                <a:solidFill>
+                  <a:schemeClr val="tx1"/>
+                </a:solidFill>
+                <a:effectLst/>
+                <a:latin typeface="+mn-lt"/>
+                <a:ea typeface="+mn-ea"/>
+                <a:cs typeface="+mn-cs"/>
+              </a:defRPr>
+            </a:lvl1pPr>
+            <a:lvl2pPr marL="742950" indent="-285750" algn="l" defTabSz="457200" rtl="0" eaLnBrk="1" latinLnBrk="0" hangingPunct="1">
+              <a:spcBef>
+                <a:spcPts val="0"/>
+              </a:spcBef>
+              <a:spcAft>
+                <a:spcPts val="1000"/>
+              </a:spcAft>
+              <a:buClr>
+                <a:schemeClr val="tx1"/>
+              </a:buClr>
+              <a:buSzPct val="100000"/>
+              <a:buFont typeface="Arial"/>
+              <a:buChar char="•"/>
+              <a:defRPr sz="1600" kern="1200" cap="none">
+                <a:solidFill>
+                  <a:schemeClr val="tx1"/>
+                </a:solidFill>
+                <a:effectLst/>
+                <a:latin typeface="+mn-lt"/>
+                <a:ea typeface="+mn-ea"/>
+                <a:cs typeface="+mn-cs"/>
+              </a:defRPr>
+            </a:lvl2pPr>
+            <a:lvl3pPr marL="1200150" indent="-285750" algn="l" defTabSz="457200" rtl="0" eaLnBrk="1" latinLnBrk="0" hangingPunct="1">
+              <a:spcBef>
+                <a:spcPts val="0"/>
+              </a:spcBef>
+              <a:spcAft>
+                <a:spcPts val="1000"/>
+              </a:spcAft>
+              <a:buClr>
+                <a:schemeClr val="tx1"/>
+              </a:buClr>
+              <a:buSzPct val="100000"/>
+              <a:buFont typeface="Arial"/>
+              <a:buChar char="•"/>
+              <a:defRPr sz="1400" kern="1200" cap="none">
+                <a:solidFill>
+                  <a:schemeClr val="tx1"/>
+                </a:solidFill>
+                <a:effectLst/>
+                <a:latin typeface="+mn-lt"/>
+                <a:ea typeface="+mn-ea"/>
+                <a:cs typeface="+mn-cs"/>
+              </a:defRPr>
+            </a:lvl3pPr>
+            <a:lvl4pPr marL="1543050" indent="-171450" algn="l" defTabSz="457200" rtl="0" eaLnBrk="1" latinLnBrk="0" hangingPunct="1">
+              <a:spcBef>
+                <a:spcPts val="0"/>
+              </a:spcBef>
+              <a:spcAft>
+                <a:spcPts val="1000"/>
+              </a:spcAft>
+              <a:buClr>
+                <a:schemeClr val="tx1"/>
+              </a:buClr>
+              <a:buSzPct val="100000"/>
+              <a:buFont typeface="Arial"/>
+              <a:buChar char="•"/>
+              <a:defRPr sz="1200" kern="1200" cap="none">
+                <a:solidFill>
+                  <a:schemeClr val="tx1"/>
+                </a:solidFill>
+                <a:effectLst/>
+                <a:latin typeface="+mn-lt"/>
+                <a:ea typeface="+mn-ea"/>
+                <a:cs typeface="+mn-cs"/>
+              </a:defRPr>
+            </a:lvl4pPr>
+            <a:lvl5pPr marL="2000250" indent="-171450" algn="l" defTabSz="457200" rtl="0" eaLnBrk="1" latinLnBrk="0" hangingPunct="1">
+              <a:spcBef>
+                <a:spcPts val="0"/>
+              </a:spcBef>
+              <a:spcAft>
+                <a:spcPts val="1000"/>
+              </a:spcAft>
+              <a:buClr>
+                <a:schemeClr val="tx1"/>
+              </a:buClr>
+              <a:buSzPct val="100000"/>
+              <a:buFont typeface="Arial"/>
+              <a:buChar char="•"/>
+              <a:defRPr sz="1200" kern="1200" cap="none">
+                <a:solidFill>
+                  <a:schemeClr val="tx1"/>
+                </a:solidFill>
+                <a:effectLst/>
+                <a:latin typeface="+mn-lt"/>
+                <a:ea typeface="+mn-ea"/>
+                <a:cs typeface="+mn-cs"/>
+              </a:defRPr>
+            </a:lvl5pPr>
+            <a:lvl6pPr marL="2514600" indent="-228600" algn="l" defTabSz="457200" rtl="0" eaLnBrk="1" latinLnBrk="0" hangingPunct="1">
+              <a:spcBef>
+                <a:spcPts val="0"/>
+              </a:spcBef>
+              <a:spcAft>
+                <a:spcPts val="1000"/>
+              </a:spcAft>
+              <a:buClr>
+                <a:schemeClr val="tx1"/>
+              </a:buClr>
+              <a:buSzPct val="100000"/>
+              <a:buFont typeface="Arial"/>
+              <a:buChar char="•"/>
+              <a:defRPr sz="1200" kern="1200" cap="none">
+                <a:solidFill>
+                  <a:schemeClr val="tx1"/>
+                </a:solidFill>
+                <a:effectLst/>
+                <a:latin typeface="+mn-lt"/>
+                <a:ea typeface="+mn-ea"/>
+                <a:cs typeface="+mn-cs"/>
+              </a:defRPr>
+            </a:lvl6pPr>
+            <a:lvl7pPr marL="2971800" indent="-228600" algn="l" defTabSz="457200" rtl="0" eaLnBrk="1" latinLnBrk="0" hangingPunct="1">
+              <a:spcBef>
+                <a:spcPts val="0"/>
+              </a:spcBef>
+              <a:spcAft>
+                <a:spcPts val="1000"/>
+              </a:spcAft>
+              <a:buClr>
+                <a:schemeClr val="tx1"/>
+              </a:buClr>
+              <a:buSzPct val="100000"/>
+              <a:buFont typeface="Arial"/>
+              <a:buChar char="•"/>
+              <a:defRPr sz="1200" kern="1200" cap="none">
+                <a:solidFill>
+                  <a:schemeClr val="tx1"/>
+                </a:solidFill>
+                <a:effectLst/>
+                <a:latin typeface="+mn-lt"/>
+                <a:ea typeface="+mn-ea"/>
+                <a:cs typeface="+mn-cs"/>
+              </a:defRPr>
+            </a:lvl7pPr>
+            <a:lvl8pPr marL="3429000" indent="-228600" algn="l" defTabSz="457200" rtl="0" eaLnBrk="1" latinLnBrk="0" hangingPunct="1">
+              <a:spcBef>
+                <a:spcPts val="0"/>
+              </a:spcBef>
+              <a:spcAft>
+                <a:spcPts val="1000"/>
+              </a:spcAft>
+              <a:buClr>
+                <a:schemeClr val="tx1"/>
+              </a:buClr>
+              <a:buSzPct val="100000"/>
+              <a:buFont typeface="Arial"/>
+              <a:buChar char="•"/>
+              <a:defRPr sz="1200" kern="1200" cap="none">
+                <a:solidFill>
+                  <a:schemeClr val="tx1"/>
+                </a:solidFill>
+                <a:effectLst/>
+                <a:latin typeface="+mn-lt"/>
+                <a:ea typeface="+mn-ea"/>
+                <a:cs typeface="+mn-cs"/>
+              </a:defRPr>
+            </a:lvl8pPr>
+            <a:lvl9pPr marL="3886200" indent="-228600" algn="l" defTabSz="457200" rtl="0" eaLnBrk="1" latinLnBrk="0" hangingPunct="1">
+              <a:spcBef>
+                <a:spcPts val="0"/>
+              </a:spcBef>
+              <a:spcAft>
+                <a:spcPts val="1000"/>
+              </a:spcAft>
+              <a:buClr>
+                <a:schemeClr val="tx1"/>
+              </a:buClr>
+              <a:buSzPct val="100000"/>
+              <a:buFont typeface="Arial"/>
+              <a:buChar char="•"/>
+              <a:defRPr sz="1200" kern="1200" cap="none">
+                <a:solidFill>
+                  <a:schemeClr val="tx1"/>
+                </a:solidFill>
+                <a:effectLst/>
+                <a:latin typeface="+mn-lt"/>
+                <a:ea typeface="+mn-ea"/>
+                <a:cs typeface="+mn-cs"/>
+              </a:defRPr>
+            </a:lvl9pPr>
+          </a:lstStyle>
+          <a:p>
+            <a:endParaRPr lang="en-GB" sz="4000" dirty="0" smtClean="0">
+              <a:latin typeface="+mj-lt"/>
+            </a:endParaRPr>
+          </a:p>
+          <a:p>
+            <a:endParaRPr lang="en-GB" sz="4000" dirty="0" smtClean="0">
+              <a:latin typeface="+mj-lt"/>
+            </a:endParaRPr>
+          </a:p>
+          <a:p>
+            <a:endParaRPr lang="en-GB" sz="4000" dirty="0">
+              <a:latin typeface="+mj-lt"/>
+            </a:endParaRPr>
+          </a:p>
+        </p:txBody>
+      </p:sp>
+      <p:pic>
+        <p:nvPicPr>
+          <p:cNvPr id="9" name="Immagine 8"/>
+          <p:cNvPicPr>
+            <a:picLocks noChangeAspect="1"/>
+          </p:cNvPicPr>
+          <p:nvPr/>
+        </p:nvPicPr>
+        <p:blipFill rotWithShape="1">
+          <a:blip r:embed="rId4">
+            <a:extLst>
+              <a:ext uri="{28A0092B-C50C-407E-A947-70E740481C1C}">
+                <a14:useLocalDpi xmlns:a14="http://schemas.microsoft.com/office/drawing/2010/main" val="0"/>
+              </a:ext>
+            </a:extLst>
+          </a:blip>
+          <a:srcRect t="14619"/>
+          <a:stretch/>
+        </p:blipFill>
+        <p:spPr>
+          <a:xfrm>
+            <a:off x="2785258" y="1850166"/>
+            <a:ext cx="6456306" cy="4408129"/>
+          </a:xfrm>
+          <a:prstGeom prst="rect">
+            <a:avLst/>
+          </a:prstGeom>
+        </p:spPr>
+      </p:pic>
+      <p:sp>
+        <p:nvSpPr>
+          <p:cNvPr id="6" name="Rettangolo 5"/>
+          <p:cNvSpPr/>
+          <p:nvPr/>
+        </p:nvSpPr>
+        <p:spPr>
+          <a:xfrm>
+            <a:off x="2709301" y="1156926"/>
+            <a:ext cx="3304110" cy="769441"/>
+          </a:xfrm>
+          <a:prstGeom prst="rect">
+            <a:avLst/>
+          </a:prstGeom>
+          <a:noFill/>
+          <a:ln>
+            <a:noFill/>
+          </a:ln>
+        </p:spPr>
+        <p:txBody>
+          <a:bodyPr wrap="none" lIns="91440" tIns="45720" rIns="91440" bIns="45720">
+            <a:spAutoFit/>
+          </a:bodyPr>
+          <a:lstStyle/>
+          <a:p>
+            <a:pPr algn="ctr"/>
+            <a:r>
+              <a:rPr lang="de-CH" sz="4400" dirty="0" smtClean="0">
+                <a:ln w="0"/>
+                <a:solidFill>
+                  <a:schemeClr val="tx1">
+                    <a:lumMod val="75000"/>
+                  </a:schemeClr>
+                </a:solidFill>
+                <a:effectLst>
+                  <a:outerShdw blurRad="38100" dist="19050" dir="2700000" algn="tl" rotWithShape="0">
+                    <a:schemeClr val="dk1">
+                      <a:alpha val="40000"/>
+                    </a:schemeClr>
+                  </a:outerShdw>
+                </a:effectLst>
+              </a:rPr>
+              <a:t>TRADITIONAL</a:t>
+            </a:r>
+            <a:endParaRPr lang="de-CH" sz="4400" b="1" spc="50" dirty="0">
+              <a:ln w="9525" cmpd="sng">
+                <a:solidFill>
+                  <a:schemeClr val="accent1"/>
+                </a:solidFill>
+                <a:prstDash val="solid"/>
+              </a:ln>
+              <a:solidFill>
+                <a:schemeClr val="tx1">
+                  <a:lumMod val="75000"/>
+                </a:schemeClr>
+              </a:solidFill>
+              <a:effectLst>
+                <a:glow rad="38100">
+                  <a:schemeClr val="accent1">
+                    <a:alpha val="40000"/>
+                  </a:schemeClr>
+                </a:glow>
+              </a:effectLst>
+            </a:endParaRPr>
+          </a:p>
+        </p:txBody>
+      </p:sp>
+      <p:sp>
+        <p:nvSpPr>
+          <p:cNvPr id="11" name="Rettangolo 10"/>
+          <p:cNvSpPr/>
+          <p:nvPr/>
+        </p:nvSpPr>
+        <p:spPr>
+          <a:xfrm>
+            <a:off x="6712142" y="1156925"/>
+            <a:ext cx="1830693" cy="769441"/>
+          </a:xfrm>
+          <a:prstGeom prst="rect">
+            <a:avLst/>
+          </a:prstGeom>
+          <a:noFill/>
+          <a:ln>
+            <a:noFill/>
+          </a:ln>
+        </p:spPr>
+        <p:txBody>
+          <a:bodyPr wrap="none" lIns="91440" tIns="45720" rIns="91440" bIns="45720">
+            <a:spAutoFit/>
+          </a:bodyPr>
+          <a:lstStyle/>
+          <a:p>
+            <a:pPr algn="ctr"/>
+            <a:r>
+              <a:rPr lang="de-CH" sz="4400" dirty="0" smtClean="0">
+                <a:ln w="0"/>
+                <a:solidFill>
+                  <a:srgbClr val="FFC000"/>
+                </a:solidFill>
+                <a:effectLst>
+                  <a:outerShdw blurRad="38100" dist="19050" dir="2700000" algn="tl" rotWithShape="0">
+                    <a:schemeClr val="dk1">
+                      <a:alpha val="40000"/>
+                    </a:schemeClr>
+                  </a:outerShdw>
+                </a:effectLst>
+              </a:rPr>
+              <a:t>SMART</a:t>
+            </a:r>
+            <a:endParaRPr lang="de-CH" sz="4400" b="1" spc="50" dirty="0">
+              <a:ln w="9525" cmpd="sng">
+                <a:solidFill>
+                  <a:schemeClr val="accent1"/>
+                </a:solidFill>
+                <a:prstDash val="solid"/>
+              </a:ln>
+              <a:solidFill>
+                <a:srgbClr val="FFC000"/>
+              </a:solidFill>
+              <a:effectLst>
+                <a:glow rad="38100">
+                  <a:schemeClr val="accent1">
+                    <a:alpha val="40000"/>
+                  </a:schemeClr>
+                </a:glow>
+              </a:effectLst>
+            </a:endParaRPr>
+          </a:p>
+        </p:txBody>
+      </p:sp>
+    </p:spTree>
+    <p:extLst>
+      <p:ext uri="{BB962C8B-B14F-4D97-AF65-F5344CB8AC3E}">
+        <p14:creationId xmlns:p14="http://schemas.microsoft.com/office/powerpoint/2010/main" val="2018984926"/>
+      </p:ext>
+    </p:extLst>
+  </p:cSld>
+  <p:clrMapOvr>
+    <a:masterClrMapping/>
+  </p:clrMapOvr>
+  <mc:AlternateContent xmlns:mc="http://schemas.openxmlformats.org/markup-compatibility/2006">
+    <mc:Choice xmlns:p14="http://schemas.microsoft.com/office/powerpoint/2010/main" Requires="p14">
+      <p:transition spd="med" p14:dur="700">
+        <p:fade/>
+      </p:transition>
+    </mc:Choice>
+    <mc:Fallback>
+      <p:transition spd="med">
+        <p:fade/>
+      </p:transition>
+    </mc:Fallback>
+  </mc:AlternateContent>
+  <p:timing>
+    <p:tnLst>
+      <p:par>
+        <p:cTn id="1" dur="indefinite" restart="never" nodeType="tmRoot"/>
+      </p:par>
+    </p:tnLst>
+  </p:timing>
+</p:sld>
+</file>
+
+<file path=ppt/slides/slide22.xml><?xml version="1.0" encoding="utf-8"?>
+<p:sld xmlns:a="http://schemas.openxmlformats.org/drawingml/2006/main" xmlns:r="http://schemas.openxmlformats.org/officeDocument/2006/relationships" xmlns:p="http://schemas.openxmlformats.org/presentationml/2006/main">
+  <p:cSld>
+    <p:spTree>
+      <p:nvGrpSpPr>
+        <p:cNvPr id="1" name=""/>
+        <p:cNvGrpSpPr/>
+        <p:nvPr/>
+      </p:nvGrpSpPr>
+      <p:grpSpPr>
+        <a:xfrm>
+          <a:off x="0" y="0"/>
+          <a:ext cx="0" cy="0"/>
+          <a:chOff x="0" y="0"/>
+          <a:chExt cx="0" cy="0"/>
+        </a:xfrm>
+      </p:grpSpPr>
+      <p:sp>
+        <p:nvSpPr>
+          <p:cNvPr id="5" name="Segnaposto contenuto 2"/>
+          <p:cNvSpPr>
+            <a:spLocks noGrp="1"/>
+          </p:cNvSpPr>
+          <p:nvPr>
+            <p:ph idx="1"/>
+          </p:nvPr>
+        </p:nvSpPr>
+        <p:spPr>
+          <a:xfrm>
+            <a:off x="671947" y="1850167"/>
+            <a:ext cx="10131425" cy="4557560"/>
+          </a:xfrm>
+        </p:spPr>
+        <p:txBody>
+          <a:bodyPr>
+            <a:normAutofit/>
+          </a:bodyPr>
+          <a:lstStyle/>
+          <a:p>
+            <a:endParaRPr lang="en-GB" sz="4000" dirty="0" smtClean="0">
+              <a:latin typeface="+mj-lt"/>
+            </a:endParaRPr>
+          </a:p>
+          <a:p>
+            <a:endParaRPr lang="en-GB" sz="4000" dirty="0" smtClean="0">
+              <a:latin typeface="+mj-lt"/>
+            </a:endParaRPr>
+          </a:p>
+          <a:p>
+            <a:endParaRPr lang="en-GB" sz="4000" dirty="0">
+              <a:latin typeface="+mj-lt"/>
+            </a:endParaRPr>
+          </a:p>
+        </p:txBody>
+      </p:sp>
+      <p:pic>
+        <p:nvPicPr>
+          <p:cNvPr id="2" name="Immagine 1"/>
+          <p:cNvPicPr>
+            <a:picLocks noChangeAspect="1"/>
+          </p:cNvPicPr>
+          <p:nvPr/>
+        </p:nvPicPr>
+        <p:blipFill>
+          <a:blip r:embed="rId3">
+            <a:alphaModFix amt="50000"/>
+            <a:extLst>
+              <a:ext uri="{28A0092B-C50C-407E-A947-70E740481C1C}">
+                <a14:useLocalDpi xmlns:a14="http://schemas.microsoft.com/office/drawing/2010/main" val="0"/>
+              </a:ext>
+            </a:extLst>
+          </a:blip>
+          <a:stretch>
+            <a:fillRect/>
+          </a:stretch>
+        </p:blipFill>
+        <p:spPr>
+          <a:xfrm>
+            <a:off x="-844117" y="0"/>
+            <a:ext cx="14025600" cy="7012800"/>
+          </a:xfrm>
+          <a:prstGeom prst="rect">
+            <a:avLst/>
+          </a:prstGeom>
+        </p:spPr>
+      </p:pic>
+      <p:sp>
+        <p:nvSpPr>
+          <p:cNvPr id="7" name="Titolo 1"/>
+          <p:cNvSpPr>
+            <a:spLocks noGrp="1"/>
+          </p:cNvSpPr>
+          <p:nvPr>
+            <p:ph type="title"/>
+          </p:nvPr>
+        </p:nvSpPr>
+        <p:spPr>
+          <a:xfrm>
+            <a:off x="387927" y="484909"/>
+            <a:ext cx="10131425" cy="1067385"/>
+          </a:xfrm>
+        </p:spPr>
+        <p:txBody>
+          <a:bodyPr/>
+          <a:lstStyle/>
+          <a:p>
+            <a:pPr marL="742950" marR="0" lvl="0" indent="-742950" defTabSz="914400" eaLnBrk="1" fontAlgn="auto" latinLnBrk="0" hangingPunct="1">
+              <a:lnSpc>
+                <a:spcPct val="100000"/>
+              </a:lnSpc>
+              <a:spcBef>
+                <a:spcPts val="0"/>
+              </a:spcBef>
+              <a:spcAft>
+                <a:spcPts val="0"/>
+              </a:spcAft>
+              <a:buClrTx/>
+              <a:buSzTx/>
+              <a:buFont typeface="+mj-lt"/>
+              <a:buNone/>
+              <a:tabLst/>
+              <a:defRPr/>
+            </a:pPr>
+            <a:r>
+              <a:rPr lang="en-GB" dirty="0" smtClean="0"/>
+              <a:t>3.1</a:t>
+            </a:r>
+            <a:r>
+              <a:rPr lang="en-GB" dirty="0" smtClean="0"/>
+              <a:t>	</a:t>
+            </a:r>
+            <a:r>
+              <a:rPr lang="en-GB" sz="4000" dirty="0" smtClean="0"/>
+              <a:t>What is a smart </a:t>
+            </a:r>
+            <a:r>
+              <a:rPr lang="en-GB" sz="4000" dirty="0" err="1" smtClean="0"/>
+              <a:t>contracT</a:t>
+            </a:r>
+            <a:r>
+              <a:rPr lang="en-GB" sz="4000" dirty="0" smtClean="0"/>
+              <a:t>?</a:t>
+            </a:r>
+            <a:endParaRPr lang="en-GB" sz="4000" dirty="0"/>
+          </a:p>
+        </p:txBody>
+      </p:sp>
+      <p:sp>
+        <p:nvSpPr>
+          <p:cNvPr id="8" name="Segnaposto contenuto 2"/>
+          <p:cNvSpPr txBox="1">
+            <a:spLocks/>
+          </p:cNvSpPr>
+          <p:nvPr/>
+        </p:nvSpPr>
+        <p:spPr>
+          <a:xfrm>
+            <a:off x="824347" y="2002567"/>
+            <a:ext cx="10131425" cy="4557560"/>
+          </a:xfrm>
+          <a:prstGeom prst="rect">
+            <a:avLst/>
+          </a:prstGeom>
+        </p:spPr>
+        <p:txBody>
+          <a:bodyPr vert="horz" lIns="91440" tIns="45720" rIns="91440" bIns="45720" rtlCol="0" anchor="ctr">
+            <a:normAutofit/>
+          </a:bodyPr>
+          <a:lstStyle>
+            <a:lvl1pPr marL="285750" indent="-285750" algn="l" defTabSz="457200" rtl="0" eaLnBrk="1" latinLnBrk="0" hangingPunct="1">
+              <a:spcBef>
+                <a:spcPts val="0"/>
+              </a:spcBef>
+              <a:spcAft>
+                <a:spcPts val="1000"/>
+              </a:spcAft>
+              <a:buClr>
+                <a:schemeClr val="tx1"/>
+              </a:buClr>
+              <a:buSzPct val="100000"/>
+              <a:buFont typeface="Arial"/>
+              <a:buChar char="•"/>
+              <a:defRPr sz="1800" kern="1200" cap="none">
+                <a:solidFill>
+                  <a:schemeClr val="tx1"/>
+                </a:solidFill>
+                <a:effectLst/>
+                <a:latin typeface="+mn-lt"/>
+                <a:ea typeface="+mn-ea"/>
+                <a:cs typeface="+mn-cs"/>
+              </a:defRPr>
+            </a:lvl1pPr>
+            <a:lvl2pPr marL="742950" indent="-285750" algn="l" defTabSz="457200" rtl="0" eaLnBrk="1" latinLnBrk="0" hangingPunct="1">
+              <a:spcBef>
+                <a:spcPts val="0"/>
+              </a:spcBef>
+              <a:spcAft>
+                <a:spcPts val="1000"/>
+              </a:spcAft>
+              <a:buClr>
+                <a:schemeClr val="tx1"/>
+              </a:buClr>
+              <a:buSzPct val="100000"/>
+              <a:buFont typeface="Arial"/>
+              <a:buChar char="•"/>
+              <a:defRPr sz="1600" kern="1200" cap="none">
+                <a:solidFill>
+                  <a:schemeClr val="tx1"/>
+                </a:solidFill>
+                <a:effectLst/>
+                <a:latin typeface="+mn-lt"/>
+                <a:ea typeface="+mn-ea"/>
+                <a:cs typeface="+mn-cs"/>
+              </a:defRPr>
+            </a:lvl2pPr>
+            <a:lvl3pPr marL="1200150" indent="-285750" algn="l" defTabSz="457200" rtl="0" eaLnBrk="1" latinLnBrk="0" hangingPunct="1">
+              <a:spcBef>
+                <a:spcPts val="0"/>
+              </a:spcBef>
+              <a:spcAft>
+                <a:spcPts val="1000"/>
+              </a:spcAft>
+              <a:buClr>
+                <a:schemeClr val="tx1"/>
+              </a:buClr>
+              <a:buSzPct val="100000"/>
+              <a:buFont typeface="Arial"/>
+              <a:buChar char="•"/>
+              <a:defRPr sz="1400" kern="1200" cap="none">
+                <a:solidFill>
+                  <a:schemeClr val="tx1"/>
+                </a:solidFill>
+                <a:effectLst/>
+                <a:latin typeface="+mn-lt"/>
+                <a:ea typeface="+mn-ea"/>
+                <a:cs typeface="+mn-cs"/>
+              </a:defRPr>
+            </a:lvl3pPr>
+            <a:lvl4pPr marL="1543050" indent="-171450" algn="l" defTabSz="457200" rtl="0" eaLnBrk="1" latinLnBrk="0" hangingPunct="1">
+              <a:spcBef>
+                <a:spcPts val="0"/>
+              </a:spcBef>
+              <a:spcAft>
+                <a:spcPts val="1000"/>
+              </a:spcAft>
+              <a:buClr>
+                <a:schemeClr val="tx1"/>
+              </a:buClr>
+              <a:buSzPct val="100000"/>
+              <a:buFont typeface="Arial"/>
+              <a:buChar char="•"/>
+              <a:defRPr sz="1200" kern="1200" cap="none">
+                <a:solidFill>
+                  <a:schemeClr val="tx1"/>
+                </a:solidFill>
+                <a:effectLst/>
+                <a:latin typeface="+mn-lt"/>
+                <a:ea typeface="+mn-ea"/>
+                <a:cs typeface="+mn-cs"/>
+              </a:defRPr>
+            </a:lvl4pPr>
+            <a:lvl5pPr marL="2000250" indent="-171450" algn="l" defTabSz="457200" rtl="0" eaLnBrk="1" latinLnBrk="0" hangingPunct="1">
+              <a:spcBef>
+                <a:spcPts val="0"/>
+              </a:spcBef>
+              <a:spcAft>
+                <a:spcPts val="1000"/>
+              </a:spcAft>
+              <a:buClr>
+                <a:schemeClr val="tx1"/>
+              </a:buClr>
+              <a:buSzPct val="100000"/>
+              <a:buFont typeface="Arial"/>
+              <a:buChar char="•"/>
+              <a:defRPr sz="1200" kern="1200" cap="none">
+                <a:solidFill>
+                  <a:schemeClr val="tx1"/>
+                </a:solidFill>
+                <a:effectLst/>
+                <a:latin typeface="+mn-lt"/>
+                <a:ea typeface="+mn-ea"/>
+                <a:cs typeface="+mn-cs"/>
+              </a:defRPr>
+            </a:lvl5pPr>
+            <a:lvl6pPr marL="2514600" indent="-228600" algn="l" defTabSz="457200" rtl="0" eaLnBrk="1" latinLnBrk="0" hangingPunct="1">
+              <a:spcBef>
+                <a:spcPts val="0"/>
+              </a:spcBef>
+              <a:spcAft>
+                <a:spcPts val="1000"/>
+              </a:spcAft>
+              <a:buClr>
+                <a:schemeClr val="tx1"/>
+              </a:buClr>
+              <a:buSzPct val="100000"/>
+              <a:buFont typeface="Arial"/>
+              <a:buChar char="•"/>
+              <a:defRPr sz="1200" kern="1200" cap="none">
+                <a:solidFill>
+                  <a:schemeClr val="tx1"/>
+                </a:solidFill>
+                <a:effectLst/>
+                <a:latin typeface="+mn-lt"/>
+                <a:ea typeface="+mn-ea"/>
+                <a:cs typeface="+mn-cs"/>
+              </a:defRPr>
+            </a:lvl6pPr>
+            <a:lvl7pPr marL="2971800" indent="-228600" algn="l" defTabSz="457200" rtl="0" eaLnBrk="1" latinLnBrk="0" hangingPunct="1">
+              <a:spcBef>
+                <a:spcPts val="0"/>
+              </a:spcBef>
+              <a:spcAft>
+                <a:spcPts val="1000"/>
+              </a:spcAft>
+              <a:buClr>
+                <a:schemeClr val="tx1"/>
+              </a:buClr>
+              <a:buSzPct val="100000"/>
+              <a:buFont typeface="Arial"/>
+              <a:buChar char="•"/>
+              <a:defRPr sz="1200" kern="1200" cap="none">
+                <a:solidFill>
+                  <a:schemeClr val="tx1"/>
+                </a:solidFill>
+                <a:effectLst/>
+                <a:latin typeface="+mn-lt"/>
+                <a:ea typeface="+mn-ea"/>
+                <a:cs typeface="+mn-cs"/>
+              </a:defRPr>
+            </a:lvl7pPr>
+            <a:lvl8pPr marL="3429000" indent="-228600" algn="l" defTabSz="457200" rtl="0" eaLnBrk="1" latinLnBrk="0" hangingPunct="1">
+              <a:spcBef>
+                <a:spcPts val="0"/>
+              </a:spcBef>
+              <a:spcAft>
+                <a:spcPts val="1000"/>
+              </a:spcAft>
+              <a:buClr>
+                <a:schemeClr val="tx1"/>
+              </a:buClr>
+              <a:buSzPct val="100000"/>
+              <a:buFont typeface="Arial"/>
+              <a:buChar char="•"/>
+              <a:defRPr sz="1200" kern="1200" cap="none">
+                <a:solidFill>
+                  <a:schemeClr val="tx1"/>
+                </a:solidFill>
+                <a:effectLst/>
+                <a:latin typeface="+mn-lt"/>
+                <a:ea typeface="+mn-ea"/>
+                <a:cs typeface="+mn-cs"/>
+              </a:defRPr>
+            </a:lvl8pPr>
+            <a:lvl9pPr marL="3886200" indent="-228600" algn="l" defTabSz="457200" rtl="0" eaLnBrk="1" latinLnBrk="0" hangingPunct="1">
+              <a:spcBef>
+                <a:spcPts val="0"/>
+              </a:spcBef>
+              <a:spcAft>
+                <a:spcPts val="1000"/>
+              </a:spcAft>
+              <a:buClr>
+                <a:schemeClr val="tx1"/>
+              </a:buClr>
+              <a:buSzPct val="100000"/>
+              <a:buFont typeface="Arial"/>
+              <a:buChar char="•"/>
+              <a:defRPr sz="1200" kern="1200" cap="none">
+                <a:solidFill>
+                  <a:schemeClr val="tx1"/>
+                </a:solidFill>
+                <a:effectLst/>
+                <a:latin typeface="+mn-lt"/>
+                <a:ea typeface="+mn-ea"/>
+                <a:cs typeface="+mn-cs"/>
+              </a:defRPr>
+            </a:lvl9pPr>
+          </a:lstStyle>
+          <a:p>
+            <a:endParaRPr lang="en-GB" sz="4000" dirty="0" smtClean="0">
+              <a:latin typeface="+mj-lt"/>
+            </a:endParaRPr>
+          </a:p>
+          <a:p>
+            <a:endParaRPr lang="en-GB" sz="4000" dirty="0" smtClean="0">
+              <a:latin typeface="+mj-lt"/>
+            </a:endParaRPr>
+          </a:p>
+          <a:p>
+            <a:endParaRPr lang="en-GB" sz="4000" dirty="0">
+              <a:latin typeface="+mj-lt"/>
+            </a:endParaRPr>
+          </a:p>
+        </p:txBody>
+      </p:sp>
+    </p:spTree>
+    <p:extLst>
+      <p:ext uri="{BB962C8B-B14F-4D97-AF65-F5344CB8AC3E}">
+        <p14:creationId xmlns:p14="http://schemas.microsoft.com/office/powerpoint/2010/main" val="988774857"/>
       </p:ext>
     </p:extLst>
   </p:cSld>

</xml_diff>